<commit_message>
Add key differentiators and unique innovations to the presentation outline
</commit_message>
<xml_diff>
--- a/docs/reviews/InitialReview.pptx
+++ b/docs/reviews/InitialReview.pptx
@@ -5,19 +5,20 @@
     <p:sldMasterId id="2147483648" r:id="rId1"/>
   </p:sldMasterIdLst>
   <p:notesMasterIdLst>
-    <p:notesMasterId r:id="rId12"/>
+    <p:notesMasterId r:id="rId13"/>
   </p:notesMasterIdLst>
   <p:sldIdLst>
     <p:sldId id="256" r:id="rId2"/>
     <p:sldId id="257" r:id="rId3"/>
     <p:sldId id="258" r:id="rId4"/>
     <p:sldId id="259" r:id="rId5"/>
-    <p:sldId id="260" r:id="rId6"/>
-    <p:sldId id="261" r:id="rId7"/>
-    <p:sldId id="262" r:id="rId8"/>
-    <p:sldId id="263" r:id="rId9"/>
-    <p:sldId id="264" r:id="rId10"/>
-    <p:sldId id="265" r:id="rId11"/>
+    <p:sldId id="268" r:id="rId6"/>
+    <p:sldId id="260" r:id="rId7"/>
+    <p:sldId id="261" r:id="rId8"/>
+    <p:sldId id="262" r:id="rId9"/>
+    <p:sldId id="263" r:id="rId10"/>
+    <p:sldId id="264" r:id="rId11"/>
+    <p:sldId id="265" r:id="rId12"/>
   </p:sldIdLst>
   <p:sldSz cx="12192000" cy="6858000"/>
   <p:notesSz cx="6858000" cy="9144000"/>
@@ -206,7 +207,7 @@
           <a:p>
             <a:fld id="{4C63BBEA-FECF-4D43-AC9B-D538F81B5DD0}" type="datetimeFigureOut">
               <a:rPr lang="en-IN" smtClean="0"/>
-              <a:t>29-01-2026</a:t>
+              <a:t>30-01-2026</a:t>
             </a:fld>
             <a:endParaRPr lang="en-IN"/>
           </a:p>
@@ -539,7 +540,7 @@
           <a:p>
             <a:fld id="{87E66349-C8FC-4393-9931-6493CA7701D2}" type="slidenum">
               <a:rPr lang="en-IN" smtClean="0"/>
-              <a:t>7</a:t>
+              <a:t>8</a:t>
             </a:fld>
             <a:endParaRPr lang="en-IN"/>
           </a:p>
@@ -707,7 +708,7 @@
           <a:p>
             <a:fld id="{E878789F-F9DB-4530-8C25-110B0D054CC1}" type="datetime1">
               <a:rPr lang="en-IN" smtClean="0"/>
-              <a:t>29-01-2026</a:t>
+              <a:t>30-01-2026</a:t>
             </a:fld>
             <a:endParaRPr lang="en-IN"/>
           </a:p>
@@ -910,7 +911,7 @@
           <a:p>
             <a:fld id="{E553FF21-6505-4C84-96E4-5BB9E49E4D59}" type="datetime1">
               <a:rPr lang="en-IN" smtClean="0"/>
-              <a:t>29-01-2026</a:t>
+              <a:t>30-01-2026</a:t>
             </a:fld>
             <a:endParaRPr lang="en-IN"/>
           </a:p>
@@ -1123,7 +1124,7 @@
           <a:p>
             <a:fld id="{258DB23C-65CE-4DF1-B83A-BF822E2BB1E2}" type="datetime1">
               <a:rPr lang="en-IN" smtClean="0"/>
-              <a:t>29-01-2026</a:t>
+              <a:t>30-01-2026</a:t>
             </a:fld>
             <a:endParaRPr lang="en-IN"/>
           </a:p>
@@ -1326,7 +1327,7 @@
           <a:p>
             <a:fld id="{E84E8654-D33C-4DCB-9E51-97BE8221D6F4}" type="datetime1">
               <a:rPr lang="en-IN" smtClean="0"/>
-              <a:t>29-01-2026</a:t>
+              <a:t>30-01-2026</a:t>
             </a:fld>
             <a:endParaRPr lang="en-IN"/>
           </a:p>
@@ -1605,7 +1606,7 @@
           <a:p>
             <a:fld id="{95146A81-BEA3-4E4D-B534-A24D8164FB16}" type="datetime1">
               <a:rPr lang="en-IN" smtClean="0"/>
-              <a:t>29-01-2026</a:t>
+              <a:t>30-01-2026</a:t>
             </a:fld>
             <a:endParaRPr lang="en-IN"/>
           </a:p>
@@ -1876,7 +1877,7 @@
           <a:p>
             <a:fld id="{54D6FABE-82CC-4207-869A-9FE43B3BD437}" type="datetime1">
               <a:rPr lang="en-IN" smtClean="0"/>
-              <a:t>29-01-2026</a:t>
+              <a:t>30-01-2026</a:t>
             </a:fld>
             <a:endParaRPr lang="en-IN"/>
           </a:p>
@@ -2294,7 +2295,7 @@
           <a:p>
             <a:fld id="{86EF1235-0950-4FAD-858A-38CB385E7D42}" type="datetime1">
               <a:rPr lang="en-IN" smtClean="0"/>
-              <a:t>29-01-2026</a:t>
+              <a:t>30-01-2026</a:t>
             </a:fld>
             <a:endParaRPr lang="en-IN"/>
           </a:p>
@@ -2439,7 +2440,7 @@
           <a:p>
             <a:fld id="{BD8863E3-7281-408C-9B85-54974F772BFB}" type="datetime1">
               <a:rPr lang="en-IN" smtClean="0"/>
-              <a:t>29-01-2026</a:t>
+              <a:t>30-01-2026</a:t>
             </a:fld>
             <a:endParaRPr lang="en-IN"/>
           </a:p>
@@ -2555,7 +2556,7 @@
           <a:p>
             <a:fld id="{4EF6E01D-8E84-4FD9-8310-14FDAB3430B3}" type="datetime1">
               <a:rPr lang="en-IN" smtClean="0"/>
-              <a:t>29-01-2026</a:t>
+              <a:t>30-01-2026</a:t>
             </a:fld>
             <a:endParaRPr lang="en-IN"/>
           </a:p>
@@ -2871,7 +2872,7 @@
           <a:p>
             <a:fld id="{720ECDF0-E057-4B1B-A251-53AA1CD4F4AC}" type="datetime1">
               <a:rPr lang="en-IN" smtClean="0"/>
-              <a:t>29-01-2026</a:t>
+              <a:t>30-01-2026</a:t>
             </a:fld>
             <a:endParaRPr lang="en-IN"/>
           </a:p>
@@ -3163,7 +3164,7 @@
           <a:p>
             <a:fld id="{0C126048-8DFC-4F0B-B0D2-A7DD9A044575}" type="datetime1">
               <a:rPr lang="en-IN" smtClean="0"/>
-              <a:t>29-01-2026</a:t>
+              <a:t>30-01-2026</a:t>
             </a:fld>
             <a:endParaRPr lang="en-IN"/>
           </a:p>
@@ -3409,7 +3410,7 @@
           <a:p>
             <a:fld id="{B242912F-57C5-4A5B-9D5F-FC9CE38D3A67}" type="datetime1">
               <a:rPr lang="en-IN" smtClean="0"/>
-              <a:t>29-01-2026</a:t>
+              <a:t>30-01-2026</a:t>
             </a:fld>
             <a:endParaRPr lang="en-IN"/>
           </a:p>
@@ -3952,7 +3953,7 @@
           <a:p>
             <a:fld id="{EB2939BA-5729-4EFC-8D80-E7A944AEDDFE}" type="datetime1">
               <a:rPr lang="en-IN" smtClean="0"/>
-              <a:t>29-01-2026</a:t>
+              <a:t>30-01-2026</a:t>
             </a:fld>
             <a:endParaRPr lang="en-IN"/>
           </a:p>
@@ -4407,7 +4408,7 @@
         <p:cNvPr id="1" name="">
           <a:extLst>
             <a:ext uri="{FF2B5EF4-FFF2-40B4-BE49-F238E27FC236}">
-              <a16:creationId xmlns:a16="http://schemas.microsoft.com/office/drawing/2014/main" id="{7555D94B-E965-F6CE-D6F9-A64F5608E662}"/>
+              <a16:creationId xmlns:a16="http://schemas.microsoft.com/office/drawing/2014/main" id="{C09A3A96-DF10-CD63-52ED-46D98BBDA00F}"/>
             </a:ext>
           </a:extLst>
         </p:cNvPr>
@@ -4427,7 +4428,7 @@
           <p:cNvPr id="5" name="Rectangle 4">
             <a:extLst>
               <a:ext uri="{FF2B5EF4-FFF2-40B4-BE49-F238E27FC236}">
-                <a16:creationId xmlns:a16="http://schemas.microsoft.com/office/drawing/2014/main" id="{2E9AB1A8-97EA-856E-02A5-849E5CA02E72}"/>
+                <a16:creationId xmlns:a16="http://schemas.microsoft.com/office/drawing/2014/main" id="{96B1B34A-1853-0742-7462-F187FFA1DEE5}"/>
               </a:ext>
             </a:extLst>
           </p:cNvPr>
@@ -4470,7 +4471,7 @@
             <a:pPr algn="ctr"/>
             <a:r>
               <a:rPr lang="en-IN" b="1" dirty="0"/>
-              <a:t>Conclusion &amp; Future Scope</a:t>
+              <a:t>AI &amp; ML Integration</a:t>
             </a:r>
           </a:p>
         </p:txBody>
@@ -4480,7 +4481,7 @@
           <p:cNvPr id="2" name="Date Placeholder 1">
             <a:extLst>
               <a:ext uri="{FF2B5EF4-FFF2-40B4-BE49-F238E27FC236}">
-                <a16:creationId xmlns:a16="http://schemas.microsoft.com/office/drawing/2014/main" id="{971CC288-1E88-C6A8-EDA3-9EB2506C43FB}"/>
+                <a16:creationId xmlns:a16="http://schemas.microsoft.com/office/drawing/2014/main" id="{62D76BF2-F5AC-ED9B-4D0F-31F0A1F2C499}"/>
               </a:ext>
             </a:extLst>
           </p:cNvPr>
@@ -4498,7 +4499,7 @@
           <a:p>
             <a:fld id="{1C740526-B13C-439A-9391-99AE71BAF217}" type="datetime1">
               <a:rPr lang="en-IN" smtClean="0"/>
-              <a:t>29-01-2026</a:t>
+              <a:t>30-01-2026</a:t>
             </a:fld>
             <a:endParaRPr lang="en-IN"/>
           </a:p>
@@ -4509,7 +4510,7 @@
           <p:cNvPr id="3" name="Footer Placeholder 2">
             <a:extLst>
               <a:ext uri="{FF2B5EF4-FFF2-40B4-BE49-F238E27FC236}">
-                <a16:creationId xmlns:a16="http://schemas.microsoft.com/office/drawing/2014/main" id="{F855488B-E085-0FDE-02FE-187FECE014B1}"/>
+                <a16:creationId xmlns:a16="http://schemas.microsoft.com/office/drawing/2014/main" id="{1A5F2079-7110-08CD-62D2-181FECB98E57}"/>
               </a:ext>
             </a:extLst>
           </p:cNvPr>
@@ -4537,7 +4538,7 @@
           <p:cNvPr id="4" name="Slide Number Placeholder 3">
             <a:extLst>
               <a:ext uri="{FF2B5EF4-FFF2-40B4-BE49-F238E27FC236}">
-                <a16:creationId xmlns:a16="http://schemas.microsoft.com/office/drawing/2014/main" id="{1056B3BD-E0DD-86C4-4979-B96905F45FDC}"/>
+                <a16:creationId xmlns:a16="http://schemas.microsoft.com/office/drawing/2014/main" id="{45DBB245-E953-C5D5-2D01-AEAFBBFFBC84}"/>
               </a:ext>
             </a:extLst>
           </p:cNvPr>
@@ -4556,6 +4557,472 @@
             <a:fld id="{9C613C33-E173-4B61-B09A-57E6CCB9A758}" type="slidenum">
               <a:rPr lang="en-IN" smtClean="0"/>
               <a:t>10</a:t>
+            </a:fld>
+            <a:endParaRPr lang="en-IN"/>
+          </a:p>
+        </p:txBody>
+      </p:sp>
+      <p:sp>
+        <p:nvSpPr>
+          <p:cNvPr id="6" name="Content Placeholder 2">
+            <a:extLst>
+              <a:ext uri="{FF2B5EF4-FFF2-40B4-BE49-F238E27FC236}">
+                <a16:creationId xmlns:a16="http://schemas.microsoft.com/office/drawing/2014/main" id="{3198424D-2440-30D4-8F33-FBD620A9F664}"/>
+              </a:ext>
+            </a:extLst>
+          </p:cNvPr>
+          <p:cNvSpPr txBox="1">
+            <a:spLocks/>
+          </p:cNvSpPr>
+          <p:nvPr/>
+        </p:nvSpPr>
+        <p:spPr>
+          <a:xfrm>
+            <a:off x="0" y="1600200"/>
+            <a:ext cx="12192000" cy="4525963"/>
+          </a:xfrm>
+          <a:prstGeom prst="rect">
+            <a:avLst/>
+          </a:prstGeom>
+        </p:spPr>
+        <p:txBody>
+          <a:bodyPr vert="horz" lIns="91440" tIns="45720" rIns="91440" bIns="45720" rtlCol="0">
+            <a:normAutofit/>
+          </a:bodyPr>
+          <a:lstStyle>
+            <a:lvl1pPr marL="0" indent="0" algn="ctr" defTabSz="914400" rtl="0" eaLnBrk="1" latinLnBrk="0" hangingPunct="1">
+              <a:lnSpc>
+                <a:spcPct val="90000"/>
+              </a:lnSpc>
+              <a:spcBef>
+                <a:spcPts val="1000"/>
+              </a:spcBef>
+              <a:buFont typeface="Arial" panose="020B0604020202020204" pitchFamily="34" charset="0"/>
+              <a:buNone/>
+              <a:defRPr sz="2400" kern="1200">
+                <a:solidFill>
+                  <a:schemeClr val="tx1"/>
+                </a:solidFill>
+                <a:latin typeface="+mn-lt"/>
+                <a:ea typeface="+mn-ea"/>
+                <a:cs typeface="+mn-cs"/>
+              </a:defRPr>
+            </a:lvl1pPr>
+            <a:lvl2pPr marL="457200" indent="0" algn="ctr" defTabSz="914400" rtl="0" eaLnBrk="1" latinLnBrk="0" hangingPunct="1">
+              <a:lnSpc>
+                <a:spcPct val="90000"/>
+              </a:lnSpc>
+              <a:spcBef>
+                <a:spcPts val="500"/>
+              </a:spcBef>
+              <a:buFont typeface="Arial" panose="020B0604020202020204" pitchFamily="34" charset="0"/>
+              <a:buNone/>
+              <a:defRPr sz="2000" kern="1200">
+                <a:solidFill>
+                  <a:schemeClr val="tx1"/>
+                </a:solidFill>
+                <a:latin typeface="+mn-lt"/>
+                <a:ea typeface="+mn-ea"/>
+                <a:cs typeface="+mn-cs"/>
+              </a:defRPr>
+            </a:lvl2pPr>
+            <a:lvl3pPr marL="914400" indent="0" algn="ctr" defTabSz="914400" rtl="0" eaLnBrk="1" latinLnBrk="0" hangingPunct="1">
+              <a:lnSpc>
+                <a:spcPct val="90000"/>
+              </a:lnSpc>
+              <a:spcBef>
+                <a:spcPts val="500"/>
+              </a:spcBef>
+              <a:buFont typeface="Arial" panose="020B0604020202020204" pitchFamily="34" charset="0"/>
+              <a:buNone/>
+              <a:defRPr sz="1800" kern="1200">
+                <a:solidFill>
+                  <a:schemeClr val="tx1"/>
+                </a:solidFill>
+                <a:latin typeface="+mn-lt"/>
+                <a:ea typeface="+mn-ea"/>
+                <a:cs typeface="+mn-cs"/>
+              </a:defRPr>
+            </a:lvl3pPr>
+            <a:lvl4pPr marL="1371600" indent="0" algn="ctr" defTabSz="914400" rtl="0" eaLnBrk="1" latinLnBrk="0" hangingPunct="1">
+              <a:lnSpc>
+                <a:spcPct val="90000"/>
+              </a:lnSpc>
+              <a:spcBef>
+                <a:spcPts val="500"/>
+              </a:spcBef>
+              <a:buFont typeface="Arial" panose="020B0604020202020204" pitchFamily="34" charset="0"/>
+              <a:buNone/>
+              <a:defRPr sz="1600" kern="1200">
+                <a:solidFill>
+                  <a:schemeClr val="tx1"/>
+                </a:solidFill>
+                <a:latin typeface="+mn-lt"/>
+                <a:ea typeface="+mn-ea"/>
+                <a:cs typeface="+mn-cs"/>
+              </a:defRPr>
+            </a:lvl4pPr>
+            <a:lvl5pPr marL="1828800" indent="0" algn="ctr" defTabSz="914400" rtl="0" eaLnBrk="1" latinLnBrk="0" hangingPunct="1">
+              <a:lnSpc>
+                <a:spcPct val="90000"/>
+              </a:lnSpc>
+              <a:spcBef>
+                <a:spcPts val="500"/>
+              </a:spcBef>
+              <a:buFont typeface="Arial" panose="020B0604020202020204" pitchFamily="34" charset="0"/>
+              <a:buNone/>
+              <a:defRPr sz="1600" kern="1200">
+                <a:solidFill>
+                  <a:schemeClr val="tx1"/>
+                </a:solidFill>
+                <a:latin typeface="+mn-lt"/>
+                <a:ea typeface="+mn-ea"/>
+                <a:cs typeface="+mn-cs"/>
+              </a:defRPr>
+            </a:lvl5pPr>
+            <a:lvl6pPr marL="2286000" indent="0" algn="ctr" defTabSz="914400" rtl="0" eaLnBrk="1" latinLnBrk="0" hangingPunct="1">
+              <a:lnSpc>
+                <a:spcPct val="90000"/>
+              </a:lnSpc>
+              <a:spcBef>
+                <a:spcPts val="500"/>
+              </a:spcBef>
+              <a:buFont typeface="Arial" panose="020B0604020202020204" pitchFamily="34" charset="0"/>
+              <a:buNone/>
+              <a:defRPr sz="1600" kern="1200">
+                <a:solidFill>
+                  <a:schemeClr val="tx1"/>
+                </a:solidFill>
+                <a:latin typeface="+mn-lt"/>
+                <a:ea typeface="+mn-ea"/>
+                <a:cs typeface="+mn-cs"/>
+              </a:defRPr>
+            </a:lvl6pPr>
+            <a:lvl7pPr marL="2743200" indent="0" algn="ctr" defTabSz="914400" rtl="0" eaLnBrk="1" latinLnBrk="0" hangingPunct="1">
+              <a:lnSpc>
+                <a:spcPct val="90000"/>
+              </a:lnSpc>
+              <a:spcBef>
+                <a:spcPts val="500"/>
+              </a:spcBef>
+              <a:buFont typeface="Arial" panose="020B0604020202020204" pitchFamily="34" charset="0"/>
+              <a:buNone/>
+              <a:defRPr sz="1600" kern="1200">
+                <a:solidFill>
+                  <a:schemeClr val="tx1"/>
+                </a:solidFill>
+                <a:latin typeface="+mn-lt"/>
+                <a:ea typeface="+mn-ea"/>
+                <a:cs typeface="+mn-cs"/>
+              </a:defRPr>
+            </a:lvl7pPr>
+            <a:lvl8pPr marL="3200400" indent="0" algn="ctr" defTabSz="914400" rtl="0" eaLnBrk="1" latinLnBrk="0" hangingPunct="1">
+              <a:lnSpc>
+                <a:spcPct val="90000"/>
+              </a:lnSpc>
+              <a:spcBef>
+                <a:spcPts val="500"/>
+              </a:spcBef>
+              <a:buFont typeface="Arial" panose="020B0604020202020204" pitchFamily="34" charset="0"/>
+              <a:buNone/>
+              <a:defRPr sz="1600" kern="1200">
+                <a:solidFill>
+                  <a:schemeClr val="tx1"/>
+                </a:solidFill>
+                <a:latin typeface="+mn-lt"/>
+                <a:ea typeface="+mn-ea"/>
+                <a:cs typeface="+mn-cs"/>
+              </a:defRPr>
+            </a:lvl8pPr>
+            <a:lvl9pPr marL="3657600" indent="0" algn="ctr" defTabSz="914400" rtl="0" eaLnBrk="1" latinLnBrk="0" hangingPunct="1">
+              <a:lnSpc>
+                <a:spcPct val="90000"/>
+              </a:lnSpc>
+              <a:spcBef>
+                <a:spcPts val="500"/>
+              </a:spcBef>
+              <a:buFont typeface="Arial" panose="020B0604020202020204" pitchFamily="34" charset="0"/>
+              <a:buNone/>
+              <a:defRPr sz="1600" kern="1200">
+                <a:solidFill>
+                  <a:schemeClr val="tx1"/>
+                </a:solidFill>
+                <a:latin typeface="+mn-lt"/>
+                <a:ea typeface="+mn-ea"/>
+                <a:cs typeface="+mn-cs"/>
+              </a:defRPr>
+            </a:lvl9pPr>
+          </a:lstStyle>
+          <a:p>
+            <a:pPr algn="l"/>
+            <a:r>
+              <a:rPr lang="en-US" dirty="0"/>
+              <a:t>Beyond Simple Matching:</a:t>
+            </a:r>
+          </a:p>
+          <a:p>
+            <a:pPr algn="l">
+              <a:lnSpc>
+                <a:spcPct val="150000"/>
+              </a:lnSpc>
+            </a:pPr>
+            <a:r>
+              <a:rPr lang="en-US" dirty="0"/>
+              <a:t>GenAI (Google Gemini):</a:t>
+            </a:r>
+          </a:p>
+          <a:p>
+            <a:pPr marL="800100" lvl="1" indent="-342900" algn="l">
+              <a:lnSpc>
+                <a:spcPct val="150000"/>
+              </a:lnSpc>
+              <a:buFont typeface="Wingdings" panose="05000000000000000000" pitchFamily="2" charset="2"/>
+              <a:buChar char="ü"/>
+            </a:pPr>
+            <a:r>
+              <a:rPr lang="en-US" dirty="0"/>
+              <a:t>Input: Source text, Target text, Scores.</a:t>
+            </a:r>
+          </a:p>
+          <a:p>
+            <a:pPr marL="800100" lvl="1" indent="-342900" algn="l">
+              <a:lnSpc>
+                <a:spcPct val="150000"/>
+              </a:lnSpc>
+              <a:buFont typeface="Wingdings" panose="05000000000000000000" pitchFamily="2" charset="2"/>
+              <a:buChar char="ü"/>
+            </a:pPr>
+            <a:r>
+              <a:rPr lang="en-US" dirty="0"/>
+              <a:t>Output: "Matched because description is 95% similar and numeric identifiers '1001' are identical."</a:t>
+            </a:r>
+          </a:p>
+          <a:p>
+            <a:pPr algn="l">
+              <a:lnSpc>
+                <a:spcPct val="150000"/>
+              </a:lnSpc>
+            </a:pPr>
+            <a:r>
+              <a:rPr lang="en-US" dirty="0"/>
+              <a:t>ML Confidence Model:</a:t>
+            </a:r>
+          </a:p>
+          <a:p>
+            <a:pPr marL="800100" lvl="1" indent="-342900" algn="l">
+              <a:lnSpc>
+                <a:spcPct val="150000"/>
+              </a:lnSpc>
+              <a:buFont typeface="Wingdings" panose="05000000000000000000" pitchFamily="2" charset="2"/>
+              <a:buChar char="ü"/>
+            </a:pPr>
+            <a:r>
+              <a:rPr lang="en-US" dirty="0"/>
+              <a:t>Features used: Text Score, Numeric Presence, Token Overlap.</a:t>
+            </a:r>
+          </a:p>
+          <a:p>
+            <a:pPr marL="800100" lvl="1" indent="-342900" algn="l">
+              <a:lnSpc>
+                <a:spcPct val="150000"/>
+              </a:lnSpc>
+              <a:buFont typeface="Wingdings" panose="05000000000000000000" pitchFamily="2" charset="2"/>
+              <a:buChar char="ü"/>
+            </a:pPr>
+            <a:r>
+              <a:rPr lang="en-US" dirty="0"/>
+              <a:t>Output: Confidence Level (HIGH / MEDIUM / LOW).</a:t>
+            </a:r>
+          </a:p>
+          <a:p>
+            <a:pPr marL="800100" lvl="1" indent="-342900" algn="l">
+              <a:lnSpc>
+                <a:spcPct val="150000"/>
+              </a:lnSpc>
+              <a:buFont typeface="Wingdings" panose="05000000000000000000" pitchFamily="2" charset="2"/>
+              <a:buChar char="ü"/>
+            </a:pPr>
+            <a:r>
+              <a:rPr lang="en-US" dirty="0"/>
+              <a:t>Benefit: Helps analysts prioritize manual review for Low/Medium confidence matches.</a:t>
+            </a:r>
+          </a:p>
+          <a:p>
+            <a:pPr algn="l"/>
+            <a:endParaRPr lang="en-US" dirty="0"/>
+          </a:p>
+        </p:txBody>
+      </p:sp>
+    </p:spTree>
+    <p:extLst>
+      <p:ext uri="{BB962C8B-B14F-4D97-AF65-F5344CB8AC3E}">
+        <p14:creationId xmlns:p14="http://schemas.microsoft.com/office/powerpoint/2010/main" val="18298761"/>
+      </p:ext>
+    </p:extLst>
+  </p:cSld>
+  <p:clrMapOvr>
+    <a:masterClrMapping/>
+  </p:clrMapOvr>
+</p:sld>
+</file>
+
+<file path=ppt/slides/slide11.xml><?xml version="1.0" encoding="utf-8"?>
+<p:sld xmlns:a="http://schemas.openxmlformats.org/drawingml/2006/main" xmlns:r="http://schemas.openxmlformats.org/officeDocument/2006/relationships" xmlns:p="http://schemas.openxmlformats.org/presentationml/2006/main">
+  <p:cSld>
+    <p:spTree>
+      <p:nvGrpSpPr>
+        <p:cNvPr id="1" name="">
+          <a:extLst>
+            <a:ext uri="{FF2B5EF4-FFF2-40B4-BE49-F238E27FC236}">
+              <a16:creationId xmlns:a16="http://schemas.microsoft.com/office/drawing/2014/main" id="{7555D94B-E965-F6CE-D6F9-A64F5608E662}"/>
+            </a:ext>
+          </a:extLst>
+        </p:cNvPr>
+        <p:cNvGrpSpPr/>
+        <p:nvPr/>
+      </p:nvGrpSpPr>
+      <p:grpSpPr>
+        <a:xfrm>
+          <a:off x="0" y="0"/>
+          <a:ext cx="0" cy="0"/>
+          <a:chOff x="0" y="0"/>
+          <a:chExt cx="0" cy="0"/>
+        </a:xfrm>
+      </p:grpSpPr>
+      <p:sp>
+        <p:nvSpPr>
+          <p:cNvPr id="5" name="Rectangle 4">
+            <a:extLst>
+              <a:ext uri="{FF2B5EF4-FFF2-40B4-BE49-F238E27FC236}">
+                <a16:creationId xmlns:a16="http://schemas.microsoft.com/office/drawing/2014/main" id="{2E9AB1A8-97EA-856E-02A5-849E5CA02E72}"/>
+              </a:ext>
+            </a:extLst>
+          </p:cNvPr>
+          <p:cNvSpPr/>
+          <p:nvPr/>
+        </p:nvSpPr>
+        <p:spPr>
+          <a:xfrm>
+            <a:off x="0" y="0"/>
+            <a:ext cx="12192000" cy="438912"/>
+          </a:xfrm>
+          <a:prstGeom prst="rect">
+            <a:avLst/>
+          </a:prstGeom>
+          <a:solidFill>
+            <a:schemeClr val="tx1">
+              <a:lumMod val="65000"/>
+              <a:lumOff val="35000"/>
+            </a:schemeClr>
+          </a:solidFill>
+        </p:spPr>
+        <p:style>
+          <a:lnRef idx="0">
+            <a:schemeClr val="dk1"/>
+          </a:lnRef>
+          <a:fillRef idx="3">
+            <a:schemeClr val="dk1"/>
+          </a:fillRef>
+          <a:effectRef idx="3">
+            <a:schemeClr val="dk1"/>
+          </a:effectRef>
+          <a:fontRef idx="minor">
+            <a:schemeClr val="lt1"/>
+          </a:fontRef>
+        </p:style>
+        <p:txBody>
+          <a:bodyPr rtlCol="0" anchor="ctr"/>
+          <a:lstStyle/>
+          <a:p>
+            <a:pPr algn="ctr"/>
+            <a:r>
+              <a:rPr lang="en-IN" b="1" dirty="0"/>
+              <a:t>Conclusion &amp; Future Scope</a:t>
+            </a:r>
+          </a:p>
+        </p:txBody>
+      </p:sp>
+      <p:sp>
+        <p:nvSpPr>
+          <p:cNvPr id="2" name="Date Placeholder 1">
+            <a:extLst>
+              <a:ext uri="{FF2B5EF4-FFF2-40B4-BE49-F238E27FC236}">
+                <a16:creationId xmlns:a16="http://schemas.microsoft.com/office/drawing/2014/main" id="{971CC288-1E88-C6A8-EDA3-9EB2506C43FB}"/>
+              </a:ext>
+            </a:extLst>
+          </p:cNvPr>
+          <p:cNvSpPr>
+            <a:spLocks noGrp="1"/>
+          </p:cNvSpPr>
+          <p:nvPr>
+            <p:ph type="dt" sz="half" idx="10"/>
+          </p:nvPr>
+        </p:nvSpPr>
+        <p:spPr/>
+        <p:txBody>
+          <a:bodyPr/>
+          <a:lstStyle/>
+          <a:p>
+            <a:fld id="{1C740526-B13C-439A-9391-99AE71BAF217}" type="datetime1">
+              <a:rPr lang="en-IN" smtClean="0"/>
+              <a:t>30-01-2026</a:t>
+            </a:fld>
+            <a:endParaRPr lang="en-IN"/>
+          </a:p>
+        </p:txBody>
+      </p:sp>
+      <p:sp>
+        <p:nvSpPr>
+          <p:cNvPr id="3" name="Footer Placeholder 2">
+            <a:extLst>
+              <a:ext uri="{FF2B5EF4-FFF2-40B4-BE49-F238E27FC236}">
+                <a16:creationId xmlns:a16="http://schemas.microsoft.com/office/drawing/2014/main" id="{F855488B-E085-0FDE-02FE-187FECE014B1}"/>
+              </a:ext>
+            </a:extLst>
+          </p:cNvPr>
+          <p:cNvSpPr>
+            <a:spLocks noGrp="1"/>
+          </p:cNvSpPr>
+          <p:nvPr>
+            <p:ph type="ftr" sz="quarter" idx="11"/>
+          </p:nvPr>
+        </p:nvSpPr>
+        <p:spPr/>
+        <p:txBody>
+          <a:bodyPr/>
+          <a:lstStyle/>
+          <a:p>
+            <a:r>
+              <a:rPr lang="en-IN"/>
+              <a:t>Private &amp; Confidential</a:t>
+            </a:r>
+          </a:p>
+        </p:txBody>
+      </p:sp>
+      <p:sp>
+        <p:nvSpPr>
+          <p:cNvPr id="4" name="Slide Number Placeholder 3">
+            <a:extLst>
+              <a:ext uri="{FF2B5EF4-FFF2-40B4-BE49-F238E27FC236}">
+                <a16:creationId xmlns:a16="http://schemas.microsoft.com/office/drawing/2014/main" id="{1056B3BD-E0DD-86C4-4979-B96905F45FDC}"/>
+              </a:ext>
+            </a:extLst>
+          </p:cNvPr>
+          <p:cNvSpPr>
+            <a:spLocks noGrp="1"/>
+          </p:cNvSpPr>
+          <p:nvPr>
+            <p:ph type="sldNum" sz="quarter" idx="12"/>
+          </p:nvPr>
+        </p:nvSpPr>
+        <p:spPr/>
+        <p:txBody>
+          <a:bodyPr/>
+          <a:lstStyle/>
+          <a:p>
+            <a:fld id="{9C613C33-E173-4B61-B09A-57E6CCB9A758}" type="slidenum">
+              <a:rPr lang="en-IN" smtClean="0"/>
+              <a:t>11</a:t>
             </a:fld>
             <a:endParaRPr lang="en-IN"/>
           </a:p>
@@ -4970,7 +5437,7 @@
           <a:p>
             <a:fld id="{F170C6C2-2084-48DA-870E-F6A56E1E1B89}" type="datetime1">
               <a:rPr lang="en-IN" smtClean="0"/>
-              <a:t>29-01-2026</a:t>
+              <a:t>30-01-2026</a:t>
             </a:fld>
             <a:endParaRPr lang="en-IN"/>
           </a:p>
@@ -5446,7 +5913,7 @@
           <a:p>
             <a:fld id="{1C740526-B13C-439A-9391-99AE71BAF217}" type="datetime1">
               <a:rPr lang="en-IN" smtClean="0"/>
-              <a:t>29-01-2026</a:t>
+              <a:t>30-01-2026</a:t>
             </a:fld>
             <a:endParaRPr lang="en-IN" dirty="0"/>
           </a:p>
@@ -5870,7 +6337,7 @@
           <a:p>
             <a:fld id="{1C740526-B13C-439A-9391-99AE71BAF217}" type="datetime1">
               <a:rPr lang="en-IN" smtClean="0"/>
-              <a:t>29-01-2026</a:t>
+              <a:t>30-01-2026</a:t>
             </a:fld>
             <a:endParaRPr lang="en-IN" dirty="0"/>
           </a:p>
@@ -6212,7 +6679,7 @@
         <p:cNvPr id="1" name="">
           <a:extLst>
             <a:ext uri="{FF2B5EF4-FFF2-40B4-BE49-F238E27FC236}">
-              <a16:creationId xmlns:a16="http://schemas.microsoft.com/office/drawing/2014/main" id="{3FD29C77-9666-E509-1179-C0C55B342D54}"/>
+              <a16:creationId xmlns:a16="http://schemas.microsoft.com/office/drawing/2014/main" id="{766CED67-75B4-89AA-BD6E-2BB75FF97B42}"/>
             </a:ext>
           </a:extLst>
         </p:cNvPr>
@@ -6232,7 +6699,7 @@
           <p:cNvPr id="5" name="Rectangle 4">
             <a:extLst>
               <a:ext uri="{FF2B5EF4-FFF2-40B4-BE49-F238E27FC236}">
-                <a16:creationId xmlns:a16="http://schemas.microsoft.com/office/drawing/2014/main" id="{926EA52A-E3C9-D7FA-47D7-FD870E64C62B}"/>
+                <a16:creationId xmlns:a16="http://schemas.microsoft.com/office/drawing/2014/main" id="{8CA69786-25D3-7E93-9FD3-44F9905298D1}"/>
               </a:ext>
             </a:extLst>
           </p:cNvPr>
@@ -6274,8 +6741,8 @@
           <a:p>
             <a:pPr algn="ctr"/>
             <a:r>
-              <a:rPr lang="en-IN" b="1" dirty="0"/>
-              <a:t>Key Features</a:t>
+              <a:rPr lang="en-US" b="1" dirty="0"/>
+              <a:t>How This Differs from Existing Solutions</a:t>
             </a:r>
           </a:p>
         </p:txBody>
@@ -6285,7 +6752,7 @@
           <p:cNvPr id="2" name="Date Placeholder 1">
             <a:extLst>
               <a:ext uri="{FF2B5EF4-FFF2-40B4-BE49-F238E27FC236}">
-                <a16:creationId xmlns:a16="http://schemas.microsoft.com/office/drawing/2014/main" id="{03605DE2-DF61-221B-E218-5C85070AD1A8}"/>
+                <a16:creationId xmlns:a16="http://schemas.microsoft.com/office/drawing/2014/main" id="{33BE8455-08AD-CDF6-156B-68E59BE17EBD}"/>
               </a:ext>
             </a:extLst>
           </p:cNvPr>
@@ -6303,9 +6770,9 @@
           <a:p>
             <a:fld id="{1C740526-B13C-439A-9391-99AE71BAF217}" type="datetime1">
               <a:rPr lang="en-IN" smtClean="0"/>
-              <a:t>29-01-2026</a:t>
+              <a:t>30-01-2026</a:t>
             </a:fld>
-            <a:endParaRPr lang="en-IN"/>
+            <a:endParaRPr lang="en-IN" dirty="0"/>
           </a:p>
         </p:txBody>
       </p:sp>
@@ -6314,7 +6781,7 @@
           <p:cNvPr id="3" name="Footer Placeholder 2">
             <a:extLst>
               <a:ext uri="{FF2B5EF4-FFF2-40B4-BE49-F238E27FC236}">
-                <a16:creationId xmlns:a16="http://schemas.microsoft.com/office/drawing/2014/main" id="{D7C4A7FD-D19C-7634-8A26-BD0A364F6C53}"/>
+                <a16:creationId xmlns:a16="http://schemas.microsoft.com/office/drawing/2014/main" id="{EB6CDBC8-713E-E670-0017-28C53A8A8811}"/>
               </a:ext>
             </a:extLst>
           </p:cNvPr>
@@ -6331,7 +6798,7 @@
           <a:lstStyle/>
           <a:p>
             <a:r>
-              <a:rPr lang="en-IN"/>
+              <a:rPr lang="en-IN" dirty="0"/>
               <a:t>Private &amp; Confidential</a:t>
             </a:r>
           </a:p>
@@ -6342,7 +6809,7 @@
           <p:cNvPr id="4" name="Slide Number Placeholder 3">
             <a:extLst>
               <a:ext uri="{FF2B5EF4-FFF2-40B4-BE49-F238E27FC236}">
-                <a16:creationId xmlns:a16="http://schemas.microsoft.com/office/drawing/2014/main" id="{B2D627EF-730E-F979-A757-366EEE85593A}"/>
+                <a16:creationId xmlns:a16="http://schemas.microsoft.com/office/drawing/2014/main" id="{D87804CC-1354-D3E2-F088-2C68852488F4}"/>
               </a:ext>
             </a:extLst>
           </p:cNvPr>
@@ -6362,7 +6829,7 @@
               <a:rPr lang="en-IN" smtClean="0"/>
               <a:t>5</a:t>
             </a:fld>
-            <a:endParaRPr lang="en-IN"/>
+            <a:endParaRPr lang="en-IN" dirty="0"/>
           </a:p>
         </p:txBody>
       </p:sp>
@@ -6371,7 +6838,7 @@
           <p:cNvPr id="6" name="Content Placeholder 2">
             <a:extLst>
               <a:ext uri="{FF2B5EF4-FFF2-40B4-BE49-F238E27FC236}">
-                <a16:creationId xmlns:a16="http://schemas.microsoft.com/office/drawing/2014/main" id="{A3410847-01B8-E8BE-3B6E-045D920D362C}"/>
+                <a16:creationId xmlns:a16="http://schemas.microsoft.com/office/drawing/2014/main" id="{A7B589DB-AA90-98E5-04E6-9B23FCA5D249}"/>
               </a:ext>
             </a:extLst>
           </p:cNvPr>
@@ -6565,69 +7032,1063 @@
               <a:buFont typeface="Wingdings" panose="05000000000000000000" pitchFamily="2" charset="2"/>
               <a:buChar char="ü"/>
             </a:pPr>
-            <a:r>
-              <a:rPr lang="en-US" sz="2000" dirty="0"/>
-              <a:t>Deterministic Matching Engine: Text similarity (</a:t>
-            </a:r>
-            <a:r>
-              <a:rPr lang="en-US" sz="2000" dirty="0" err="1"/>
-              <a:t>RapidFuzz</a:t>
-            </a:r>
-            <a:r>
-              <a:rPr lang="en-US" sz="2000" dirty="0"/>
-              <a:t>) + Strict numeric comparison.</a:t>
-            </a:r>
-          </a:p>
-          <a:p>
-            <a:pPr marL="342900" indent="-342900" algn="l">
+            <a:endParaRPr lang="en-IN" sz="2000" dirty="0"/>
+          </a:p>
+        </p:txBody>
+      </p:sp>
+      <p:sp>
+        <p:nvSpPr>
+          <p:cNvPr id="13" name="Content Placeholder 2">
+            <a:extLst>
+              <a:ext uri="{FF2B5EF4-FFF2-40B4-BE49-F238E27FC236}">
+                <a16:creationId xmlns:a16="http://schemas.microsoft.com/office/drawing/2014/main" id="{FC494AEB-A53F-07D4-AA79-A15E41F5C204}"/>
+              </a:ext>
+            </a:extLst>
+          </p:cNvPr>
+          <p:cNvSpPr txBox="1">
+            <a:spLocks/>
+          </p:cNvSpPr>
+          <p:nvPr/>
+        </p:nvSpPr>
+        <p:spPr>
+          <a:xfrm>
+            <a:off x="-3048" y="1752600"/>
+            <a:ext cx="12192000" cy="4525963"/>
+          </a:xfrm>
+          <a:prstGeom prst="rect">
+            <a:avLst/>
+          </a:prstGeom>
+        </p:spPr>
+        <p:txBody>
+          <a:bodyPr vert="horz" lIns="91440" tIns="45720" rIns="91440" bIns="45720" rtlCol="0">
+            <a:normAutofit/>
+          </a:bodyPr>
+          <a:lstStyle>
+            <a:lvl1pPr marL="0" indent="0" algn="ctr" defTabSz="914400" rtl="0" eaLnBrk="1" latinLnBrk="0" hangingPunct="1">
+              <a:lnSpc>
+                <a:spcPct val="90000"/>
+              </a:lnSpc>
+              <a:spcBef>
+                <a:spcPts val="1000"/>
+              </a:spcBef>
+              <a:buFont typeface="Arial" panose="020B0604020202020204" pitchFamily="34" charset="0"/>
+              <a:buNone/>
+              <a:defRPr sz="2400" kern="1200">
+                <a:solidFill>
+                  <a:schemeClr val="tx1"/>
+                </a:solidFill>
+                <a:latin typeface="+mn-lt"/>
+                <a:ea typeface="+mn-ea"/>
+                <a:cs typeface="+mn-cs"/>
+              </a:defRPr>
+            </a:lvl1pPr>
+            <a:lvl2pPr marL="457200" indent="0" algn="ctr" defTabSz="914400" rtl="0" eaLnBrk="1" latinLnBrk="0" hangingPunct="1">
+              <a:lnSpc>
+                <a:spcPct val="90000"/>
+              </a:lnSpc>
+              <a:spcBef>
+                <a:spcPts val="500"/>
+              </a:spcBef>
+              <a:buFont typeface="Arial" panose="020B0604020202020204" pitchFamily="34" charset="0"/>
+              <a:buNone/>
+              <a:defRPr sz="2000" kern="1200">
+                <a:solidFill>
+                  <a:schemeClr val="tx1"/>
+                </a:solidFill>
+                <a:latin typeface="+mn-lt"/>
+                <a:ea typeface="+mn-ea"/>
+                <a:cs typeface="+mn-cs"/>
+              </a:defRPr>
+            </a:lvl2pPr>
+            <a:lvl3pPr marL="914400" indent="0" algn="ctr" defTabSz="914400" rtl="0" eaLnBrk="1" latinLnBrk="0" hangingPunct="1">
+              <a:lnSpc>
+                <a:spcPct val="90000"/>
+              </a:lnSpc>
+              <a:spcBef>
+                <a:spcPts val="500"/>
+              </a:spcBef>
+              <a:buFont typeface="Arial" panose="020B0604020202020204" pitchFamily="34" charset="0"/>
+              <a:buNone/>
+              <a:defRPr sz="1800" kern="1200">
+                <a:solidFill>
+                  <a:schemeClr val="tx1"/>
+                </a:solidFill>
+                <a:latin typeface="+mn-lt"/>
+                <a:ea typeface="+mn-ea"/>
+                <a:cs typeface="+mn-cs"/>
+              </a:defRPr>
+            </a:lvl3pPr>
+            <a:lvl4pPr marL="1371600" indent="0" algn="ctr" defTabSz="914400" rtl="0" eaLnBrk="1" latinLnBrk="0" hangingPunct="1">
+              <a:lnSpc>
+                <a:spcPct val="90000"/>
+              </a:lnSpc>
+              <a:spcBef>
+                <a:spcPts val="500"/>
+              </a:spcBef>
+              <a:buFont typeface="Arial" panose="020B0604020202020204" pitchFamily="34" charset="0"/>
+              <a:buNone/>
+              <a:defRPr sz="1600" kern="1200">
+                <a:solidFill>
+                  <a:schemeClr val="tx1"/>
+                </a:solidFill>
+                <a:latin typeface="+mn-lt"/>
+                <a:ea typeface="+mn-ea"/>
+                <a:cs typeface="+mn-cs"/>
+              </a:defRPr>
+            </a:lvl4pPr>
+            <a:lvl5pPr marL="1828800" indent="0" algn="ctr" defTabSz="914400" rtl="0" eaLnBrk="1" latinLnBrk="0" hangingPunct="1">
+              <a:lnSpc>
+                <a:spcPct val="90000"/>
+              </a:lnSpc>
+              <a:spcBef>
+                <a:spcPts val="500"/>
+              </a:spcBef>
+              <a:buFont typeface="Arial" panose="020B0604020202020204" pitchFamily="34" charset="0"/>
+              <a:buNone/>
+              <a:defRPr sz="1600" kern="1200">
+                <a:solidFill>
+                  <a:schemeClr val="tx1"/>
+                </a:solidFill>
+                <a:latin typeface="+mn-lt"/>
+                <a:ea typeface="+mn-ea"/>
+                <a:cs typeface="+mn-cs"/>
+              </a:defRPr>
+            </a:lvl5pPr>
+            <a:lvl6pPr marL="2286000" indent="0" algn="ctr" defTabSz="914400" rtl="0" eaLnBrk="1" latinLnBrk="0" hangingPunct="1">
+              <a:lnSpc>
+                <a:spcPct val="90000"/>
+              </a:lnSpc>
+              <a:spcBef>
+                <a:spcPts val="500"/>
+              </a:spcBef>
+              <a:buFont typeface="Arial" panose="020B0604020202020204" pitchFamily="34" charset="0"/>
+              <a:buNone/>
+              <a:defRPr sz="1600" kern="1200">
+                <a:solidFill>
+                  <a:schemeClr val="tx1"/>
+                </a:solidFill>
+                <a:latin typeface="+mn-lt"/>
+                <a:ea typeface="+mn-ea"/>
+                <a:cs typeface="+mn-cs"/>
+              </a:defRPr>
+            </a:lvl6pPr>
+            <a:lvl7pPr marL="2743200" indent="0" algn="ctr" defTabSz="914400" rtl="0" eaLnBrk="1" latinLnBrk="0" hangingPunct="1">
+              <a:lnSpc>
+                <a:spcPct val="90000"/>
+              </a:lnSpc>
+              <a:spcBef>
+                <a:spcPts val="500"/>
+              </a:spcBef>
+              <a:buFont typeface="Arial" panose="020B0604020202020204" pitchFamily="34" charset="0"/>
+              <a:buNone/>
+              <a:defRPr sz="1600" kern="1200">
+                <a:solidFill>
+                  <a:schemeClr val="tx1"/>
+                </a:solidFill>
+                <a:latin typeface="+mn-lt"/>
+                <a:ea typeface="+mn-ea"/>
+                <a:cs typeface="+mn-cs"/>
+              </a:defRPr>
+            </a:lvl7pPr>
+            <a:lvl8pPr marL="3200400" indent="0" algn="ctr" defTabSz="914400" rtl="0" eaLnBrk="1" latinLnBrk="0" hangingPunct="1">
+              <a:lnSpc>
+                <a:spcPct val="90000"/>
+              </a:lnSpc>
+              <a:spcBef>
+                <a:spcPts val="500"/>
+              </a:spcBef>
+              <a:buFont typeface="Arial" panose="020B0604020202020204" pitchFamily="34" charset="0"/>
+              <a:buNone/>
+              <a:defRPr sz="1600" kern="1200">
+                <a:solidFill>
+                  <a:schemeClr val="tx1"/>
+                </a:solidFill>
+                <a:latin typeface="+mn-lt"/>
+                <a:ea typeface="+mn-ea"/>
+                <a:cs typeface="+mn-cs"/>
+              </a:defRPr>
+            </a:lvl8pPr>
+            <a:lvl9pPr marL="3657600" indent="0" algn="ctr" defTabSz="914400" rtl="0" eaLnBrk="1" latinLnBrk="0" hangingPunct="1">
+              <a:lnSpc>
+                <a:spcPct val="90000"/>
+              </a:lnSpc>
+              <a:spcBef>
+                <a:spcPts val="500"/>
+              </a:spcBef>
+              <a:buFont typeface="Arial" panose="020B0604020202020204" pitchFamily="34" charset="0"/>
+              <a:buNone/>
+              <a:defRPr sz="1600" kern="1200">
+                <a:solidFill>
+                  <a:schemeClr val="tx1"/>
+                </a:solidFill>
+                <a:latin typeface="+mn-lt"/>
+                <a:ea typeface="+mn-ea"/>
+                <a:cs typeface="+mn-cs"/>
+              </a:defRPr>
+            </a:lvl9pPr>
+          </a:lstStyle>
+          <a:p>
+            <a:pPr algn="l">
               <a:lnSpc>
                 <a:spcPct val="150000"/>
               </a:lnSpc>
-              <a:buFont typeface="Wingdings" panose="05000000000000000000" pitchFamily="2" charset="2"/>
-              <a:buChar char="ü"/>
             </a:pPr>
-            <a:r>
-              <a:rPr lang="en-US" sz="2000" dirty="0"/>
-              <a:t>GenAI Explanations: Human-readable justifications for ACCEPT/REJECT decisions.</a:t>
-            </a:r>
-          </a:p>
-          <a:p>
-            <a:pPr marL="342900" indent="-342900" algn="l">
+            <a:endParaRPr lang="en-IN" sz="2000" dirty="0"/>
+          </a:p>
+        </p:txBody>
+      </p:sp>
+      <p:sp>
+        <p:nvSpPr>
+          <p:cNvPr id="14" name="Content Placeholder 2">
+            <a:extLst>
+              <a:ext uri="{FF2B5EF4-FFF2-40B4-BE49-F238E27FC236}">
+                <a16:creationId xmlns:a16="http://schemas.microsoft.com/office/drawing/2014/main" id="{6DAA1477-7A53-305D-9839-5040E7513CA4}"/>
+              </a:ext>
+            </a:extLst>
+          </p:cNvPr>
+          <p:cNvSpPr txBox="1">
+            <a:spLocks/>
+          </p:cNvSpPr>
+          <p:nvPr/>
+        </p:nvSpPr>
+        <p:spPr>
+          <a:xfrm>
+            <a:off x="-3048" y="1752600"/>
+            <a:ext cx="12192000" cy="4525963"/>
+          </a:xfrm>
+          <a:prstGeom prst="rect">
+            <a:avLst/>
+          </a:prstGeom>
+        </p:spPr>
+        <p:txBody>
+          <a:bodyPr vert="horz" lIns="91440" tIns="45720" rIns="91440" bIns="45720" rtlCol="0">
+            <a:normAutofit/>
+          </a:bodyPr>
+          <a:lstStyle>
+            <a:lvl1pPr marL="0" indent="0" algn="ctr" defTabSz="914400" rtl="0" eaLnBrk="1" latinLnBrk="0" hangingPunct="1">
+              <a:lnSpc>
+                <a:spcPct val="90000"/>
+              </a:lnSpc>
+              <a:spcBef>
+                <a:spcPts val="1000"/>
+              </a:spcBef>
+              <a:buFont typeface="Arial" panose="020B0604020202020204" pitchFamily="34" charset="0"/>
+              <a:buNone/>
+              <a:defRPr sz="2400" kern="1200">
+                <a:solidFill>
+                  <a:schemeClr val="tx1"/>
+                </a:solidFill>
+                <a:latin typeface="+mn-lt"/>
+                <a:ea typeface="+mn-ea"/>
+                <a:cs typeface="+mn-cs"/>
+              </a:defRPr>
+            </a:lvl1pPr>
+            <a:lvl2pPr marL="457200" indent="0" algn="ctr" defTabSz="914400" rtl="0" eaLnBrk="1" latinLnBrk="0" hangingPunct="1">
+              <a:lnSpc>
+                <a:spcPct val="90000"/>
+              </a:lnSpc>
+              <a:spcBef>
+                <a:spcPts val="500"/>
+              </a:spcBef>
+              <a:buFont typeface="Arial" panose="020B0604020202020204" pitchFamily="34" charset="0"/>
+              <a:buNone/>
+              <a:defRPr sz="2000" kern="1200">
+                <a:solidFill>
+                  <a:schemeClr val="tx1"/>
+                </a:solidFill>
+                <a:latin typeface="+mn-lt"/>
+                <a:ea typeface="+mn-ea"/>
+                <a:cs typeface="+mn-cs"/>
+              </a:defRPr>
+            </a:lvl2pPr>
+            <a:lvl3pPr marL="914400" indent="0" algn="ctr" defTabSz="914400" rtl="0" eaLnBrk="1" latinLnBrk="0" hangingPunct="1">
+              <a:lnSpc>
+                <a:spcPct val="90000"/>
+              </a:lnSpc>
+              <a:spcBef>
+                <a:spcPts val="500"/>
+              </a:spcBef>
+              <a:buFont typeface="Arial" panose="020B0604020202020204" pitchFamily="34" charset="0"/>
+              <a:buNone/>
+              <a:defRPr sz="1800" kern="1200">
+                <a:solidFill>
+                  <a:schemeClr val="tx1"/>
+                </a:solidFill>
+                <a:latin typeface="+mn-lt"/>
+                <a:ea typeface="+mn-ea"/>
+                <a:cs typeface="+mn-cs"/>
+              </a:defRPr>
+            </a:lvl3pPr>
+            <a:lvl4pPr marL="1371600" indent="0" algn="ctr" defTabSz="914400" rtl="0" eaLnBrk="1" latinLnBrk="0" hangingPunct="1">
+              <a:lnSpc>
+                <a:spcPct val="90000"/>
+              </a:lnSpc>
+              <a:spcBef>
+                <a:spcPts val="500"/>
+              </a:spcBef>
+              <a:buFont typeface="Arial" panose="020B0604020202020204" pitchFamily="34" charset="0"/>
+              <a:buNone/>
+              <a:defRPr sz="1600" kern="1200">
+                <a:solidFill>
+                  <a:schemeClr val="tx1"/>
+                </a:solidFill>
+                <a:latin typeface="+mn-lt"/>
+                <a:ea typeface="+mn-ea"/>
+                <a:cs typeface="+mn-cs"/>
+              </a:defRPr>
+            </a:lvl4pPr>
+            <a:lvl5pPr marL="1828800" indent="0" algn="ctr" defTabSz="914400" rtl="0" eaLnBrk="1" latinLnBrk="0" hangingPunct="1">
+              <a:lnSpc>
+                <a:spcPct val="90000"/>
+              </a:lnSpc>
+              <a:spcBef>
+                <a:spcPts val="500"/>
+              </a:spcBef>
+              <a:buFont typeface="Arial" panose="020B0604020202020204" pitchFamily="34" charset="0"/>
+              <a:buNone/>
+              <a:defRPr sz="1600" kern="1200">
+                <a:solidFill>
+                  <a:schemeClr val="tx1"/>
+                </a:solidFill>
+                <a:latin typeface="+mn-lt"/>
+                <a:ea typeface="+mn-ea"/>
+                <a:cs typeface="+mn-cs"/>
+              </a:defRPr>
+            </a:lvl5pPr>
+            <a:lvl6pPr marL="2286000" indent="0" algn="ctr" defTabSz="914400" rtl="0" eaLnBrk="1" latinLnBrk="0" hangingPunct="1">
+              <a:lnSpc>
+                <a:spcPct val="90000"/>
+              </a:lnSpc>
+              <a:spcBef>
+                <a:spcPts val="500"/>
+              </a:spcBef>
+              <a:buFont typeface="Arial" panose="020B0604020202020204" pitchFamily="34" charset="0"/>
+              <a:buNone/>
+              <a:defRPr sz="1600" kern="1200">
+                <a:solidFill>
+                  <a:schemeClr val="tx1"/>
+                </a:solidFill>
+                <a:latin typeface="+mn-lt"/>
+                <a:ea typeface="+mn-ea"/>
+                <a:cs typeface="+mn-cs"/>
+              </a:defRPr>
+            </a:lvl6pPr>
+            <a:lvl7pPr marL="2743200" indent="0" algn="ctr" defTabSz="914400" rtl="0" eaLnBrk="1" latinLnBrk="0" hangingPunct="1">
+              <a:lnSpc>
+                <a:spcPct val="90000"/>
+              </a:lnSpc>
+              <a:spcBef>
+                <a:spcPts val="500"/>
+              </a:spcBef>
+              <a:buFont typeface="Arial" panose="020B0604020202020204" pitchFamily="34" charset="0"/>
+              <a:buNone/>
+              <a:defRPr sz="1600" kern="1200">
+                <a:solidFill>
+                  <a:schemeClr val="tx1"/>
+                </a:solidFill>
+                <a:latin typeface="+mn-lt"/>
+                <a:ea typeface="+mn-ea"/>
+                <a:cs typeface="+mn-cs"/>
+              </a:defRPr>
+            </a:lvl7pPr>
+            <a:lvl8pPr marL="3200400" indent="0" algn="ctr" defTabSz="914400" rtl="0" eaLnBrk="1" latinLnBrk="0" hangingPunct="1">
+              <a:lnSpc>
+                <a:spcPct val="90000"/>
+              </a:lnSpc>
+              <a:spcBef>
+                <a:spcPts val="500"/>
+              </a:spcBef>
+              <a:buFont typeface="Arial" panose="020B0604020202020204" pitchFamily="34" charset="0"/>
+              <a:buNone/>
+              <a:defRPr sz="1600" kern="1200">
+                <a:solidFill>
+                  <a:schemeClr val="tx1"/>
+                </a:solidFill>
+                <a:latin typeface="+mn-lt"/>
+                <a:ea typeface="+mn-ea"/>
+                <a:cs typeface="+mn-cs"/>
+              </a:defRPr>
+            </a:lvl8pPr>
+            <a:lvl9pPr marL="3657600" indent="0" algn="ctr" defTabSz="914400" rtl="0" eaLnBrk="1" latinLnBrk="0" hangingPunct="1">
+              <a:lnSpc>
+                <a:spcPct val="90000"/>
+              </a:lnSpc>
+              <a:spcBef>
+                <a:spcPts val="500"/>
+              </a:spcBef>
+              <a:buFont typeface="Arial" panose="020B0604020202020204" pitchFamily="34" charset="0"/>
+              <a:buNone/>
+              <a:defRPr sz="1600" kern="1200">
+                <a:solidFill>
+                  <a:schemeClr val="tx1"/>
+                </a:solidFill>
+                <a:latin typeface="+mn-lt"/>
+                <a:ea typeface="+mn-ea"/>
+                <a:cs typeface="+mn-cs"/>
+              </a:defRPr>
+            </a:lvl9pPr>
+          </a:lstStyle>
+          <a:p>
+            <a:pPr algn="l">
               <a:lnSpc>
                 <a:spcPct val="150000"/>
               </a:lnSpc>
-              <a:buFont typeface="Wingdings" panose="05000000000000000000" pitchFamily="2" charset="2"/>
-              <a:buChar char="ü"/>
             </a:pPr>
             <a:r>
-              <a:rPr lang="en-US" sz="2000" dirty="0"/>
-              <a:t>ML-Based Confidence Scoring: Independent verification of match quality.</a:t>
-            </a:r>
-          </a:p>
-          <a:p>
-            <a:pPr marL="342900" indent="-342900" algn="l">
+              <a:rPr lang="en-IN" sz="1400" dirty="0"/>
+              <a:t>Key Differentiators</a:t>
+            </a:r>
+          </a:p>
+        </p:txBody>
+      </p:sp>
+      <p:graphicFrame>
+        <p:nvGraphicFramePr>
+          <p:cNvPr id="15" name="Table 14">
+            <a:extLst>
+              <a:ext uri="{FF2B5EF4-FFF2-40B4-BE49-F238E27FC236}">
+                <a16:creationId xmlns:a16="http://schemas.microsoft.com/office/drawing/2014/main" id="{89A864A0-6C44-A7BB-5879-67F74F9B0C00}"/>
+              </a:ext>
+            </a:extLst>
+          </p:cNvPr>
+          <p:cNvGraphicFramePr>
+            <a:graphicFrameLocks noGrp="1"/>
+          </p:cNvGraphicFramePr>
+          <p:nvPr>
+            <p:extLst>
+              <p:ext uri="{D42A27DB-BD31-4B8C-83A1-F6EECF244321}">
+                <p14:modId xmlns:p14="http://schemas.microsoft.com/office/powerpoint/2010/main" val="44017165"/>
+              </p:ext>
+            </p:extLst>
+          </p:nvPr>
+        </p:nvGraphicFramePr>
+        <p:xfrm>
+          <a:off x="93472" y="2155274"/>
+          <a:ext cx="11446257" cy="2225040"/>
+        </p:xfrm>
+        <a:graphic>
+          <a:graphicData uri="http://schemas.openxmlformats.org/drawingml/2006/table">
+            <a:tbl>
+              <a:tblPr firstRow="1" bandRow="1">
+                <a:tableStyleId>{616DA210-FB5B-4158-B5E0-FEB733F419BA}</a:tableStyleId>
+              </a:tblPr>
+              <a:tblGrid>
+                <a:gridCol w="3289808">
+                  <a:extLst>
+                    <a:ext uri="{9D8B030D-6E8A-4147-A177-3AD203B41FA5}">
+                      <a16:colId xmlns:a16="http://schemas.microsoft.com/office/drawing/2014/main" val="2455674341"/>
+                    </a:ext>
+                  </a:extLst>
+                </a:gridCol>
+                <a:gridCol w="4341030">
+                  <a:extLst>
+                    <a:ext uri="{9D8B030D-6E8A-4147-A177-3AD203B41FA5}">
+                      <a16:colId xmlns:a16="http://schemas.microsoft.com/office/drawing/2014/main" val="1696277302"/>
+                    </a:ext>
+                  </a:extLst>
+                </a:gridCol>
+                <a:gridCol w="3815419">
+                  <a:extLst>
+                    <a:ext uri="{9D8B030D-6E8A-4147-A177-3AD203B41FA5}">
+                      <a16:colId xmlns:a16="http://schemas.microsoft.com/office/drawing/2014/main" val="3564483023"/>
+                    </a:ext>
+                  </a:extLst>
+                </a:gridCol>
+              </a:tblGrid>
+              <a:tr h="370840">
+                <a:tc>
+                  <a:txBody>
+                    <a:bodyPr/>
+                    <a:lstStyle/>
+                    <a:p>
+                      <a:pPr marL="0" marR="0" lvl="0" indent="0" algn="l" defTabSz="914400" rtl="0" eaLnBrk="1" fontAlgn="auto" latinLnBrk="0" hangingPunct="1">
+                        <a:lnSpc>
+                          <a:spcPct val="100000"/>
+                        </a:lnSpc>
+                        <a:spcBef>
+                          <a:spcPts val="0"/>
+                        </a:spcBef>
+                        <a:spcAft>
+                          <a:spcPts val="0"/>
+                        </a:spcAft>
+                        <a:buClrTx/>
+                        <a:buSzTx/>
+                        <a:buFontTx/>
+                        <a:buNone/>
+                        <a:tabLst/>
+                        <a:defRPr/>
+                      </a:pPr>
+                      <a:r>
+                        <a:rPr lang="en-IN" sz="1200" b="1" kern="1200" dirty="0">
+                          <a:solidFill>
+                            <a:sysClr val="windowText" lastClr="000000"/>
+                          </a:solidFill>
+                          <a:effectLst/>
+                        </a:rPr>
+                        <a:t>Aspect</a:t>
+                      </a:r>
+                      <a:endParaRPr lang="en-IN" sz="1200" b="1" kern="1200" dirty="0">
+                        <a:solidFill>
+                          <a:sysClr val="windowText" lastClr="000000"/>
+                        </a:solidFill>
+                        <a:effectLst/>
+                        <a:latin typeface="+mn-lt"/>
+                        <a:ea typeface="+mn-ea"/>
+                        <a:cs typeface="+mn-cs"/>
+                      </a:endParaRPr>
+                    </a:p>
+                  </a:txBody>
+                  <a:tcPr/>
+                </a:tc>
+                <a:tc>
+                  <a:txBody>
+                    <a:bodyPr/>
+                    <a:lstStyle/>
+                    <a:p>
+                      <a:pPr marL="0" marR="0" lvl="0" indent="0" algn="l" defTabSz="914400" rtl="0" eaLnBrk="1" fontAlgn="auto" latinLnBrk="0" hangingPunct="1">
+                        <a:lnSpc>
+                          <a:spcPct val="100000"/>
+                        </a:lnSpc>
+                        <a:spcBef>
+                          <a:spcPts val="0"/>
+                        </a:spcBef>
+                        <a:spcAft>
+                          <a:spcPts val="0"/>
+                        </a:spcAft>
+                        <a:buClrTx/>
+                        <a:buSzTx/>
+                        <a:buFontTx/>
+                        <a:buNone/>
+                        <a:tabLst/>
+                        <a:defRPr/>
+                      </a:pPr>
+                      <a:r>
+                        <a:rPr lang="en-IN" sz="1200" b="1" kern="1200" dirty="0">
+                          <a:solidFill>
+                            <a:sysClr val="windowText" lastClr="000000"/>
+                          </a:solidFill>
+                          <a:effectLst/>
+                        </a:rPr>
+                        <a:t>Existing Solutions</a:t>
+                      </a:r>
+                      <a:endParaRPr lang="en-IN" sz="1200" b="1" kern="1200" dirty="0">
+                        <a:solidFill>
+                          <a:sysClr val="windowText" lastClr="000000"/>
+                        </a:solidFill>
+                        <a:effectLst/>
+                        <a:latin typeface="+mn-lt"/>
+                        <a:ea typeface="+mn-ea"/>
+                        <a:cs typeface="+mn-cs"/>
+                      </a:endParaRPr>
+                    </a:p>
+                  </a:txBody>
+                  <a:tcPr/>
+                </a:tc>
+                <a:tc>
+                  <a:txBody>
+                    <a:bodyPr/>
+                    <a:lstStyle/>
+                    <a:p>
+                      <a:pPr marL="0" marR="0" lvl="0" indent="0" algn="l" defTabSz="914400" rtl="0" eaLnBrk="1" fontAlgn="auto" latinLnBrk="0" hangingPunct="1">
+                        <a:lnSpc>
+                          <a:spcPct val="100000"/>
+                        </a:lnSpc>
+                        <a:spcBef>
+                          <a:spcPts val="0"/>
+                        </a:spcBef>
+                        <a:spcAft>
+                          <a:spcPts val="0"/>
+                        </a:spcAft>
+                        <a:buClrTx/>
+                        <a:buSzTx/>
+                        <a:buFontTx/>
+                        <a:buNone/>
+                        <a:tabLst/>
+                        <a:defRPr/>
+                      </a:pPr>
+                      <a:r>
+                        <a:rPr lang="en-IN" sz="1200" b="1" kern="1200" dirty="0">
+                          <a:solidFill>
+                            <a:sysClr val="windowText" lastClr="000000"/>
+                          </a:solidFill>
+                          <a:effectLst/>
+                        </a:rPr>
+                        <a:t>This Project</a:t>
+                      </a:r>
+                      <a:endParaRPr lang="en-IN" sz="1200" b="1" kern="1200" dirty="0">
+                        <a:solidFill>
+                          <a:sysClr val="windowText" lastClr="000000"/>
+                        </a:solidFill>
+                        <a:effectLst/>
+                        <a:latin typeface="+mn-lt"/>
+                        <a:ea typeface="+mn-ea"/>
+                        <a:cs typeface="+mn-cs"/>
+                      </a:endParaRPr>
+                    </a:p>
+                  </a:txBody>
+                  <a:tcPr/>
+                </a:tc>
+                <a:extLst>
+                  <a:ext uri="{0D108BD9-81ED-4DB2-BD59-A6C34878D82A}">
+                    <a16:rowId xmlns:a16="http://schemas.microsoft.com/office/drawing/2014/main" val="3108086869"/>
+                  </a:ext>
+                </a:extLst>
+              </a:tr>
+              <a:tr h="370840">
+                <a:tc>
+                  <a:txBody>
+                    <a:bodyPr/>
+                    <a:lstStyle/>
+                    <a:p>
+                      <a:pPr algn="l">
+                        <a:buNone/>
+                      </a:pPr>
+                      <a:r>
+                        <a:rPr lang="en-IN" sz="1200" b="1">
+                          <a:effectLst/>
+                        </a:rPr>
+                        <a:t>Architecture</a:t>
+                      </a:r>
+                      <a:endParaRPr lang="en-IN" sz="1200">
+                        <a:effectLst/>
+                      </a:endParaRPr>
+                    </a:p>
+                  </a:txBody>
+                  <a:tcPr marL="95250" marR="95250" marT="47625" marB="47625" anchor="ctr"/>
+                </a:tc>
+                <a:tc>
+                  <a:txBody>
+                    <a:bodyPr/>
+                    <a:lstStyle/>
+                    <a:p>
+                      <a:pPr algn="l">
+                        <a:buNone/>
+                      </a:pPr>
+                      <a:r>
+                        <a:rPr lang="en-IN" sz="1200">
+                          <a:effectLst/>
+                        </a:rPr>
+                        <a:t>Standalone scripts</a:t>
+                      </a:r>
+                    </a:p>
+                  </a:txBody>
+                  <a:tcPr marL="95250" marR="95250" marT="47625" marB="47625" anchor="ctr"/>
+                </a:tc>
+                <a:tc>
+                  <a:txBody>
+                    <a:bodyPr/>
+                    <a:lstStyle/>
+                    <a:p>
+                      <a:pPr algn="l">
+                        <a:buNone/>
+                      </a:pPr>
+                      <a:r>
+                        <a:rPr lang="en-IN" sz="1200">
+                          <a:effectLst/>
+                        </a:rPr>
+                        <a:t>N-Tier enterprise architecture</a:t>
+                      </a:r>
+                    </a:p>
+                  </a:txBody>
+                  <a:tcPr marL="95250" marR="95250" marT="47625" marB="47625" anchor="ctr"/>
+                </a:tc>
+                <a:extLst>
+                  <a:ext uri="{0D108BD9-81ED-4DB2-BD59-A6C34878D82A}">
+                    <a16:rowId xmlns:a16="http://schemas.microsoft.com/office/drawing/2014/main" val="4126091192"/>
+                  </a:ext>
+                </a:extLst>
+              </a:tr>
+              <a:tr h="370840">
+                <a:tc>
+                  <a:txBody>
+                    <a:bodyPr/>
+                    <a:lstStyle/>
+                    <a:p>
+                      <a:pPr algn="l">
+                        <a:buNone/>
+                      </a:pPr>
+                      <a:r>
+                        <a:rPr lang="en-IN" sz="1200" b="1">
+                          <a:effectLst/>
+                        </a:rPr>
+                        <a:t>Numeric Handling</a:t>
+                      </a:r>
+                      <a:endParaRPr lang="en-IN" sz="1200">
+                        <a:effectLst/>
+                      </a:endParaRPr>
+                    </a:p>
+                  </a:txBody>
+                  <a:tcPr marL="95250" marR="95250" marT="47625" marB="47625" anchor="ctr"/>
+                </a:tc>
+                <a:tc>
+                  <a:txBody>
+                    <a:bodyPr/>
+                    <a:lstStyle/>
+                    <a:p>
+                      <a:pPr algn="l">
+                        <a:buNone/>
+                      </a:pPr>
+                      <a:r>
+                        <a:rPr lang="en-IN" sz="1200">
+                          <a:effectLst/>
+                        </a:rPr>
+                        <a:t>Ignores or underweights numbers</a:t>
+                      </a:r>
+                    </a:p>
+                  </a:txBody>
+                  <a:tcPr marL="95250" marR="95250" marT="47625" marB="47625" anchor="ctr"/>
+                </a:tc>
+                <a:tc>
+                  <a:txBody>
+                    <a:bodyPr/>
+                    <a:lstStyle/>
+                    <a:p>
+                      <a:pPr algn="l">
+                        <a:buNone/>
+                      </a:pPr>
+                      <a:r>
+                        <a:rPr lang="en-IN" sz="1200">
+                          <a:effectLst/>
+                        </a:rPr>
+                        <a:t>Strict numeric comparison logic</a:t>
+                      </a:r>
+                    </a:p>
+                  </a:txBody>
+                  <a:tcPr marL="95250" marR="95250" marT="47625" marB="47625" anchor="ctr"/>
+                </a:tc>
+                <a:extLst>
+                  <a:ext uri="{0D108BD9-81ED-4DB2-BD59-A6C34878D82A}">
+                    <a16:rowId xmlns:a16="http://schemas.microsoft.com/office/drawing/2014/main" val="3586579777"/>
+                  </a:ext>
+                </a:extLst>
+              </a:tr>
+              <a:tr h="370840">
+                <a:tc>
+                  <a:txBody>
+                    <a:bodyPr/>
+                    <a:lstStyle/>
+                    <a:p>
+                      <a:pPr algn="l">
+                        <a:buNone/>
+                      </a:pPr>
+                      <a:r>
+                        <a:rPr lang="en-IN" sz="1200" b="1">
+                          <a:effectLst/>
+                        </a:rPr>
+                        <a:t>Determinism</a:t>
+                      </a:r>
+                      <a:endParaRPr lang="en-IN" sz="1200">
+                        <a:effectLst/>
+                      </a:endParaRPr>
+                    </a:p>
+                  </a:txBody>
+                  <a:tcPr marL="95250" marR="95250" marT="47625" marB="47625" anchor="ctr"/>
+                </a:tc>
+                <a:tc>
+                  <a:txBody>
+                    <a:bodyPr/>
+                    <a:lstStyle/>
+                    <a:p>
+                      <a:pPr algn="l">
+                        <a:buNone/>
+                      </a:pPr>
+                      <a:r>
+                        <a:rPr lang="en-IN" sz="1200">
+                          <a:effectLst/>
+                        </a:rPr>
+                        <a:t>Non-deterministic results</a:t>
+                      </a:r>
+                    </a:p>
+                  </a:txBody>
+                  <a:tcPr marL="95250" marR="95250" marT="47625" marB="47625" anchor="ctr"/>
+                </a:tc>
+                <a:tc>
+                  <a:txBody>
+                    <a:bodyPr/>
+                    <a:lstStyle/>
+                    <a:p>
+                      <a:pPr algn="l">
+                        <a:buNone/>
+                      </a:pPr>
+                      <a:r>
+                        <a:rPr lang="en-IN" sz="1200">
+                          <a:effectLst/>
+                        </a:rPr>
+                        <a:t>Guaranteed repeatability</a:t>
+                      </a:r>
+                    </a:p>
+                  </a:txBody>
+                  <a:tcPr marL="95250" marR="95250" marT="47625" marB="47625" anchor="ctr"/>
+                </a:tc>
+                <a:extLst>
+                  <a:ext uri="{0D108BD9-81ED-4DB2-BD59-A6C34878D82A}">
+                    <a16:rowId xmlns:a16="http://schemas.microsoft.com/office/drawing/2014/main" val="3733267510"/>
+                  </a:ext>
+                </a:extLst>
+              </a:tr>
+              <a:tr h="370840">
+                <a:tc>
+                  <a:txBody>
+                    <a:bodyPr/>
+                    <a:lstStyle/>
+                    <a:p>
+                      <a:pPr algn="l">
+                        <a:buNone/>
+                      </a:pPr>
+                      <a:r>
+                        <a:rPr lang="en-IN" sz="1200" b="1">
+                          <a:effectLst/>
+                        </a:rPr>
+                        <a:t>Explainability</a:t>
+                      </a:r>
+                      <a:endParaRPr lang="en-IN" sz="1200">
+                        <a:effectLst/>
+                      </a:endParaRPr>
+                    </a:p>
+                  </a:txBody>
+                  <a:tcPr marL="95250" marR="95250" marT="47625" marB="47625" anchor="ctr"/>
+                </a:tc>
+                <a:tc>
+                  <a:txBody>
+                    <a:bodyPr/>
+                    <a:lstStyle/>
+                    <a:p>
+                      <a:pPr algn="l">
+                        <a:buNone/>
+                      </a:pPr>
+                      <a:r>
+                        <a:rPr lang="en-IN" sz="1200">
+                          <a:effectLst/>
+                        </a:rPr>
+                        <a:t>No justifications</a:t>
+                      </a:r>
+                    </a:p>
+                  </a:txBody>
+                  <a:tcPr marL="95250" marR="95250" marT="47625" marB="47625" anchor="ctr"/>
+                </a:tc>
+                <a:tc>
+                  <a:txBody>
+                    <a:bodyPr/>
+                    <a:lstStyle/>
+                    <a:p>
+                      <a:pPr algn="l">
+                        <a:buNone/>
+                      </a:pPr>
+                      <a:r>
+                        <a:rPr lang="en-IN" sz="1200">
+                          <a:effectLst/>
+                        </a:rPr>
+                        <a:t>GenAI-powered match explanations</a:t>
+                      </a:r>
+                    </a:p>
+                  </a:txBody>
+                  <a:tcPr marL="95250" marR="95250" marT="47625" marB="47625" anchor="ctr"/>
+                </a:tc>
+                <a:extLst>
+                  <a:ext uri="{0D108BD9-81ED-4DB2-BD59-A6C34878D82A}">
+                    <a16:rowId xmlns:a16="http://schemas.microsoft.com/office/drawing/2014/main" val="3793145103"/>
+                  </a:ext>
+                </a:extLst>
+              </a:tr>
+              <a:tr h="370840">
+                <a:tc>
+                  <a:txBody>
+                    <a:bodyPr/>
+                    <a:lstStyle/>
+                    <a:p>
+                      <a:pPr algn="l">
+                        <a:buNone/>
+                      </a:pPr>
+                      <a:r>
+                        <a:rPr lang="en-IN" sz="1200" b="1">
+                          <a:effectLst/>
+                        </a:rPr>
+                        <a:t>Confidence</a:t>
+                      </a:r>
+                      <a:endParaRPr lang="en-IN" sz="1200">
+                        <a:effectLst/>
+                      </a:endParaRPr>
+                    </a:p>
+                  </a:txBody>
+                  <a:tcPr marL="95250" marR="95250" marT="47625" marB="47625" anchor="ctr"/>
+                </a:tc>
+                <a:tc>
+                  <a:txBody>
+                    <a:bodyPr/>
+                    <a:lstStyle/>
+                    <a:p>
+                      <a:pPr algn="l">
+                        <a:buNone/>
+                      </a:pPr>
+                      <a:r>
+                        <a:rPr lang="en-IN" sz="1200">
+                          <a:effectLst/>
+                        </a:rPr>
+                        <a:t>Binary accept/reject</a:t>
+                      </a:r>
+                    </a:p>
+                  </a:txBody>
+                  <a:tcPr marL="95250" marR="95250" marT="47625" marB="47625" anchor="ctr"/>
+                </a:tc>
+                <a:tc>
+                  <a:txBody>
+                    <a:bodyPr/>
+                    <a:lstStyle/>
+                    <a:p>
+                      <a:pPr algn="l">
+                        <a:buNone/>
+                      </a:pPr>
+                      <a:r>
+                        <a:rPr lang="en-US" sz="1200" dirty="0">
+                          <a:effectLst/>
+                        </a:rPr>
+                        <a:t>ML-based confidence levels (HIGH/MEDIUM/LOW)</a:t>
+                      </a:r>
+                    </a:p>
+                  </a:txBody>
+                  <a:tcPr marL="95250" marR="95250" marT="47625" marB="47625" anchor="ctr"/>
+                </a:tc>
+                <a:extLst>
+                  <a:ext uri="{0D108BD9-81ED-4DB2-BD59-A6C34878D82A}">
+                    <a16:rowId xmlns:a16="http://schemas.microsoft.com/office/drawing/2014/main" val="42209544"/>
+                  </a:ext>
+                </a:extLst>
+              </a:tr>
+            </a:tbl>
+          </a:graphicData>
+        </a:graphic>
+      </p:graphicFrame>
+      <p:sp>
+        <p:nvSpPr>
+          <p:cNvPr id="17" name="TextBox 16">
+            <a:extLst>
+              <a:ext uri="{FF2B5EF4-FFF2-40B4-BE49-F238E27FC236}">
+                <a16:creationId xmlns:a16="http://schemas.microsoft.com/office/drawing/2014/main" id="{3D7CAEFA-4465-FC95-2849-427353B22BDC}"/>
+              </a:ext>
+            </a:extLst>
+          </p:cNvPr>
+          <p:cNvSpPr txBox="1"/>
+          <p:nvPr/>
+        </p:nvSpPr>
+        <p:spPr>
+          <a:xfrm>
+            <a:off x="93473" y="4459214"/>
+            <a:ext cx="11446256" cy="1702838"/>
+          </a:xfrm>
+          <a:prstGeom prst="rect">
+            <a:avLst/>
+          </a:prstGeom>
+          <a:noFill/>
+        </p:spPr>
+        <p:txBody>
+          <a:bodyPr wrap="square">
+            <a:spAutoFit/>
+          </a:bodyPr>
+          <a:lstStyle/>
+          <a:p>
+            <a:pPr>
+              <a:lnSpc>
+                <a:spcPts val="1425"/>
+              </a:lnSpc>
+              <a:buNone/>
+            </a:pPr>
+            <a:r>
+              <a:rPr lang="en-US" sz="1200" b="1" dirty="0"/>
+              <a:t>Unique Innovations:</a:t>
+            </a:r>
+          </a:p>
+          <a:p>
+            <a:pPr>
               <a:lnSpc>
                 <a:spcPct val="150000"/>
               </a:lnSpc>
-              <a:buFont typeface="Wingdings" panose="05000000000000000000" pitchFamily="2" charset="2"/>
-              <a:buChar char="ü"/>
             </a:pPr>
             <a:r>
-              <a:rPr lang="en-US" sz="2000" dirty="0"/>
-              <a:t>Role-Based Access Control (RBAC): Secure access for Analysts and Admins.</a:t>
-            </a:r>
-          </a:p>
-          <a:p>
-            <a:pPr marL="342900" indent="-342900" algn="l">
+              <a:rPr lang="en-US" sz="1050" b="1" dirty="0"/>
+              <a:t>Numeric-Aware Matching:</a:t>
+            </a:r>
+            <a:r>
+              <a:rPr lang="en-US" sz="1050" dirty="0"/>
+              <a:t> Explicitly extracts and compares numeric identifiers (e.g., "Invoice 123" vs "Invoice 124") to prevent false positives in financial/operational data.</a:t>
+            </a:r>
+          </a:p>
+          <a:p>
+            <a:pPr>
               <a:lnSpc>
                 <a:spcPct val="150000"/>
               </a:lnSpc>
-              <a:buFont typeface="Wingdings" panose="05000000000000000000" pitchFamily="2" charset="2"/>
-              <a:buChar char="ü"/>
             </a:pPr>
             <a:r>
-              <a:rPr lang="en-US" sz="2000" dirty="0"/>
-              <a:t>Comprehensive Audit Trail: Logs every decision, score, and explanation.</a:t>
+              <a:rPr lang="en-US" sz="1050" b="1" dirty="0"/>
+              <a:t>Deterministic + AI Hybrid:</a:t>
+            </a:r>
+            <a:r>
+              <a:rPr lang="en-US" sz="1050" dirty="0"/>
+              <a:t> Guarantees repeatable matching logic while leveraging GenAI for human-readable explanations and ML for confidence scoring.</a:t>
+            </a:r>
+          </a:p>
+          <a:p>
+            <a:pPr>
+              <a:lnSpc>
+                <a:spcPct val="150000"/>
+              </a:lnSpc>
+            </a:pPr>
+            <a:r>
+              <a:rPr lang="en-US" sz="1050" b="1" dirty="0"/>
+              <a:t>Enterprise N-Tier Architecture:</a:t>
+            </a:r>
+            <a:r>
+              <a:rPr lang="en-US" sz="1050" dirty="0"/>
+              <a:t> Professional 5-layer design (Presentation → Application → Core Engine → AI/ML Services → Data Layer) suitable for academic evaluation and institutional deployment.</a:t>
+            </a:r>
+          </a:p>
+          <a:p>
+            <a:pPr>
+              <a:lnSpc>
+                <a:spcPct val="150000"/>
+              </a:lnSpc>
+            </a:pPr>
+            <a:r>
+              <a:rPr lang="en-US" sz="1050" b="1" dirty="0"/>
+              <a:t>Explainable AI for Compliance:</a:t>
+            </a:r>
+            <a:r>
+              <a:rPr lang="en-US" sz="1050" dirty="0"/>
+              <a:t> Auditors receive actionable context: </a:t>
+            </a:r>
+            <a:r>
+              <a:rPr lang="en-US" sz="1050" i="1" dirty="0"/>
+              <a:t>"Matched because description is 95% similar and numeric identifiers '1001' are identical."</a:t>
+            </a:r>
+            <a:endParaRPr lang="en-US" sz="1050" dirty="0"/>
+          </a:p>
+          <a:p>
+            <a:pPr>
+              <a:lnSpc>
+                <a:spcPct val="150000"/>
+              </a:lnSpc>
+            </a:pPr>
+            <a:r>
+              <a:rPr lang="en-US" sz="1050" b="1" dirty="0"/>
+              <a:t>Production-Ready Security:</a:t>
+            </a:r>
+            <a:r>
+              <a:rPr lang="en-US" sz="1050" dirty="0"/>
+              <a:t> JWT authentication, role-based access (Analyst/Admin), complete audit trail for regulatory compliance.</a:t>
+            </a:r>
+          </a:p>
+          <a:p>
+            <a:pPr>
+              <a:lnSpc>
+                <a:spcPct val="150000"/>
+              </a:lnSpc>
+            </a:pPr>
+            <a:r>
+              <a:rPr lang="en-US" sz="1050" b="1" dirty="0"/>
+              <a:t>Academic + Practical Balance:</a:t>
+            </a:r>
+            <a:r>
+              <a:rPr lang="en-US" sz="1050" dirty="0"/>
+              <a:t> Defendable technical decisions addressing real-world data reconciliation challenges in finance, supply chain, and healthcare.</a:t>
             </a:r>
           </a:p>
         </p:txBody>
@@ -6635,7 +8096,7 @@
     </p:spTree>
     <p:extLst>
       <p:ext uri="{BB962C8B-B14F-4D97-AF65-F5344CB8AC3E}">
-        <p14:creationId xmlns:p14="http://schemas.microsoft.com/office/powerpoint/2010/main" val="244099404"/>
+        <p14:creationId xmlns:p14="http://schemas.microsoft.com/office/powerpoint/2010/main" val="2702275132"/>
       </p:ext>
     </p:extLst>
   </p:cSld>
@@ -6653,7 +8114,7 @@
         <p:cNvPr id="1" name="">
           <a:extLst>
             <a:ext uri="{FF2B5EF4-FFF2-40B4-BE49-F238E27FC236}">
-              <a16:creationId xmlns:a16="http://schemas.microsoft.com/office/drawing/2014/main" id="{61530BC9-2264-2E26-D8E2-EBEF43FF1E0F}"/>
+              <a16:creationId xmlns:a16="http://schemas.microsoft.com/office/drawing/2014/main" id="{3FD29C77-9666-E509-1179-C0C55B342D54}"/>
             </a:ext>
           </a:extLst>
         </p:cNvPr>
@@ -6673,7 +8134,7 @@
           <p:cNvPr id="5" name="Rectangle 4">
             <a:extLst>
               <a:ext uri="{FF2B5EF4-FFF2-40B4-BE49-F238E27FC236}">
-                <a16:creationId xmlns:a16="http://schemas.microsoft.com/office/drawing/2014/main" id="{3A70F3E3-3E6E-7AC9-E0AF-CE5451E84118}"/>
+                <a16:creationId xmlns:a16="http://schemas.microsoft.com/office/drawing/2014/main" id="{926EA52A-E3C9-D7FA-47D7-FD870E64C62B}"/>
               </a:ext>
             </a:extLst>
           </p:cNvPr>
@@ -6716,7 +8177,7 @@
             <a:pPr algn="ctr"/>
             <a:r>
               <a:rPr lang="en-IN" b="1" dirty="0"/>
-              <a:t>Technology Stack</a:t>
+              <a:t>Key Features</a:t>
             </a:r>
           </a:p>
         </p:txBody>
@@ -6726,7 +8187,7 @@
           <p:cNvPr id="2" name="Date Placeholder 1">
             <a:extLst>
               <a:ext uri="{FF2B5EF4-FFF2-40B4-BE49-F238E27FC236}">
-                <a16:creationId xmlns:a16="http://schemas.microsoft.com/office/drawing/2014/main" id="{8A619D57-8CBB-742A-EEDC-52149D1FD984}"/>
+                <a16:creationId xmlns:a16="http://schemas.microsoft.com/office/drawing/2014/main" id="{03605DE2-DF61-221B-E218-5C85070AD1A8}"/>
               </a:ext>
             </a:extLst>
           </p:cNvPr>
@@ -6744,7 +8205,7 @@
           <a:p>
             <a:fld id="{1C740526-B13C-439A-9391-99AE71BAF217}" type="datetime1">
               <a:rPr lang="en-IN" smtClean="0"/>
-              <a:t>29-01-2026</a:t>
+              <a:t>30-01-2026</a:t>
             </a:fld>
             <a:endParaRPr lang="en-IN"/>
           </a:p>
@@ -6755,7 +8216,7 @@
           <p:cNvPr id="3" name="Footer Placeholder 2">
             <a:extLst>
               <a:ext uri="{FF2B5EF4-FFF2-40B4-BE49-F238E27FC236}">
-                <a16:creationId xmlns:a16="http://schemas.microsoft.com/office/drawing/2014/main" id="{8EA6EEBF-350E-CBF2-7FEF-CC4B421266D2}"/>
+                <a16:creationId xmlns:a16="http://schemas.microsoft.com/office/drawing/2014/main" id="{D7C4A7FD-D19C-7634-8A26-BD0A364F6C53}"/>
               </a:ext>
             </a:extLst>
           </p:cNvPr>
@@ -6783,7 +8244,7 @@
           <p:cNvPr id="4" name="Slide Number Placeholder 3">
             <a:extLst>
               <a:ext uri="{FF2B5EF4-FFF2-40B4-BE49-F238E27FC236}">
-                <a16:creationId xmlns:a16="http://schemas.microsoft.com/office/drawing/2014/main" id="{BC1A3A9B-3E2B-33BC-3534-534583535267}"/>
+                <a16:creationId xmlns:a16="http://schemas.microsoft.com/office/drawing/2014/main" id="{B2D627EF-730E-F979-A757-366EEE85593A}"/>
               </a:ext>
             </a:extLst>
           </p:cNvPr>
@@ -6812,7 +8273,7 @@
           <p:cNvPr id="6" name="Content Placeholder 2">
             <a:extLst>
               <a:ext uri="{FF2B5EF4-FFF2-40B4-BE49-F238E27FC236}">
-                <a16:creationId xmlns:a16="http://schemas.microsoft.com/office/drawing/2014/main" id="{14FE852E-7B98-C93E-2BD6-ECEFFE41655A}"/>
+                <a16:creationId xmlns:a16="http://schemas.microsoft.com/office/drawing/2014/main" id="{A3410847-01B8-E8BE-3B6E-045D920D362C}"/>
               </a:ext>
             </a:extLst>
           </p:cNvPr>
@@ -6999,138 +8460,84 @@
             </a:lvl9pPr>
           </a:lstStyle>
           <a:p>
-            <a:pPr algn="l"/>
-            <a:r>
-              <a:rPr lang="en-IN" dirty="0"/>
-              <a:t>Frontend:</a:t>
-            </a:r>
-          </a:p>
-          <a:p>
-            <a:pPr marL="800100" lvl="1" indent="-342900" algn="l">
+            <a:pPr marL="342900" indent="-342900" algn="l">
+              <a:lnSpc>
+                <a:spcPct val="150000"/>
+              </a:lnSpc>
               <a:buFont typeface="Wingdings" panose="05000000000000000000" pitchFamily="2" charset="2"/>
               <a:buChar char="ü"/>
             </a:pPr>
             <a:r>
-              <a:rPr lang="en-IN" dirty="0"/>
-              <a:t>React 19 (TypeScript)</a:t>
-            </a:r>
-          </a:p>
-          <a:p>
-            <a:pPr marL="800100" lvl="1" indent="-342900" algn="l">
+              <a:rPr lang="en-US" sz="2000" dirty="0"/>
+              <a:t>Deterministic Matching Engine: Text similarity (</a:t>
+            </a:r>
+            <a:r>
+              <a:rPr lang="en-US" sz="2000" dirty="0" err="1"/>
+              <a:t>RapidFuzz</a:t>
+            </a:r>
+            <a:r>
+              <a:rPr lang="en-US" sz="2000" dirty="0"/>
+              <a:t>) + Strict numeric comparison.</a:t>
+            </a:r>
+          </a:p>
+          <a:p>
+            <a:pPr marL="342900" indent="-342900" algn="l">
+              <a:lnSpc>
+                <a:spcPct val="150000"/>
+              </a:lnSpc>
               <a:buFont typeface="Wingdings" panose="05000000000000000000" pitchFamily="2" charset="2"/>
               <a:buChar char="ü"/>
             </a:pPr>
             <a:r>
-              <a:rPr lang="en-IN" dirty="0"/>
-              <a:t>Secure Authentication (JWT)</a:t>
-            </a:r>
-          </a:p>
-          <a:p>
-            <a:pPr algn="l"/>
-            <a:r>
-              <a:rPr lang="en-IN" dirty="0"/>
-              <a:t>Backend:</a:t>
-            </a:r>
-          </a:p>
-          <a:p>
-            <a:pPr marL="800100" lvl="1" indent="-342900" algn="l">
-              <a:lnSpc>
-                <a:spcPct val="100000"/>
+              <a:rPr lang="en-US" sz="2000" dirty="0"/>
+              <a:t>GenAI Explanations: Human-readable justifications for ACCEPT/REJECT decisions.</a:t>
+            </a:r>
+          </a:p>
+          <a:p>
+            <a:pPr marL="342900" indent="-342900" algn="l">
+              <a:lnSpc>
+                <a:spcPct val="150000"/>
               </a:lnSpc>
               <a:buFont typeface="Wingdings" panose="05000000000000000000" pitchFamily="2" charset="2"/>
               <a:buChar char="ü"/>
             </a:pPr>
             <a:r>
-              <a:rPr lang="en-IN" dirty="0"/>
-              <a:t>Flask 3.x (Python 3.12)</a:t>
-            </a:r>
-          </a:p>
-          <a:p>
-            <a:pPr marL="800100" lvl="1" indent="-342900" algn="l">
-              <a:lnSpc>
-                <a:spcPct val="100000"/>
+              <a:rPr lang="en-US" sz="2000" dirty="0"/>
+              <a:t>ML-Based Confidence Scoring: Independent verification of match quality.</a:t>
+            </a:r>
+          </a:p>
+          <a:p>
+            <a:pPr marL="342900" indent="-342900" algn="l">
+              <a:lnSpc>
+                <a:spcPct val="150000"/>
               </a:lnSpc>
               <a:buFont typeface="Wingdings" panose="05000000000000000000" pitchFamily="2" charset="2"/>
               <a:buChar char="ü"/>
             </a:pPr>
             <a:r>
-              <a:rPr lang="en-IN" dirty="0"/>
-              <a:t>REST API Architecture</a:t>
-            </a:r>
-          </a:p>
-          <a:p>
-            <a:pPr algn="l"/>
-            <a:r>
-              <a:rPr lang="en-IN" dirty="0"/>
-              <a:t>Data &amp; AI:</a:t>
-            </a:r>
-          </a:p>
-          <a:p>
-            <a:pPr marL="800100" lvl="1" indent="-342900" algn="l">
-              <a:lnSpc>
-                <a:spcPct val="110000"/>
+              <a:rPr lang="en-US" sz="2000" dirty="0"/>
+              <a:t>Role-Based Access Control (RBAC): Secure access for Analysts and Admins.</a:t>
+            </a:r>
+          </a:p>
+          <a:p>
+            <a:pPr marL="342900" indent="-342900" algn="l">
+              <a:lnSpc>
+                <a:spcPct val="150000"/>
               </a:lnSpc>
               <a:buFont typeface="Wingdings" panose="05000000000000000000" pitchFamily="2" charset="2"/>
               <a:buChar char="ü"/>
             </a:pPr>
             <a:r>
-              <a:rPr lang="en-IN" dirty="0"/>
-              <a:t>PostgreSQL (Database)</a:t>
-            </a:r>
-          </a:p>
-          <a:p>
-            <a:pPr marL="800100" lvl="1" indent="-342900" algn="l">
-              <a:lnSpc>
-                <a:spcPct val="110000"/>
-              </a:lnSpc>
-              <a:buFont typeface="Wingdings" panose="05000000000000000000" pitchFamily="2" charset="2"/>
-              <a:buChar char="ü"/>
-            </a:pPr>
-            <a:r>
-              <a:rPr lang="en-IN" dirty="0"/>
-              <a:t>Google Gemini (GenAI for explanations)</a:t>
-            </a:r>
-          </a:p>
-          <a:p>
-            <a:pPr marL="800100" lvl="1" indent="-342900" algn="l">
-              <a:lnSpc>
-                <a:spcPct val="110000"/>
-              </a:lnSpc>
-              <a:buFont typeface="Wingdings" panose="05000000000000000000" pitchFamily="2" charset="2"/>
-              <a:buChar char="ü"/>
-            </a:pPr>
-            <a:r>
-              <a:rPr lang="en-IN" dirty="0"/>
-              <a:t>Scikit-learn (ML for confidence scoring)</a:t>
-            </a:r>
-          </a:p>
-          <a:p>
-            <a:pPr marL="800100" lvl="1" indent="-342900" algn="l">
-              <a:lnSpc>
-                <a:spcPct val="110000"/>
-              </a:lnSpc>
-              <a:buFont typeface="Wingdings" panose="05000000000000000000" pitchFamily="2" charset="2"/>
-              <a:buChar char="ü"/>
-            </a:pPr>
-            <a:r>
-              <a:rPr lang="en-IN" dirty="0" err="1"/>
-              <a:t>RapidFuzz</a:t>
-            </a:r>
-            <a:r>
-              <a:rPr lang="en-IN" dirty="0"/>
-              <a:t> (String matching)</a:t>
-            </a:r>
-          </a:p>
-          <a:p>
-            <a:pPr algn="l"/>
-            <a:endParaRPr lang="en-IN" dirty="0"/>
+              <a:rPr lang="en-US" sz="2000" dirty="0"/>
+              <a:t>Comprehensive Audit Trail: Logs every decision, score, and explanation.</a:t>
+            </a:r>
           </a:p>
         </p:txBody>
       </p:sp>
     </p:spTree>
     <p:extLst>
       <p:ext uri="{BB962C8B-B14F-4D97-AF65-F5344CB8AC3E}">
-        <p14:creationId xmlns:p14="http://schemas.microsoft.com/office/powerpoint/2010/main" val="1230035686"/>
+        <p14:creationId xmlns:p14="http://schemas.microsoft.com/office/powerpoint/2010/main" val="244099404"/>
       </p:ext>
     </p:extLst>
   </p:cSld>
@@ -7148,7 +8555,7 @@
         <p:cNvPr id="1" name="">
           <a:extLst>
             <a:ext uri="{FF2B5EF4-FFF2-40B4-BE49-F238E27FC236}">
-              <a16:creationId xmlns:a16="http://schemas.microsoft.com/office/drawing/2014/main" id="{17A8D206-C6B6-3755-F49E-E3679B4A767A}"/>
+              <a16:creationId xmlns:a16="http://schemas.microsoft.com/office/drawing/2014/main" id="{61530BC9-2264-2E26-D8E2-EBEF43FF1E0F}"/>
             </a:ext>
           </a:extLst>
         </p:cNvPr>
@@ -7168,7 +8575,7 @@
           <p:cNvPr id="5" name="Rectangle 4">
             <a:extLst>
               <a:ext uri="{FF2B5EF4-FFF2-40B4-BE49-F238E27FC236}">
-                <a16:creationId xmlns:a16="http://schemas.microsoft.com/office/drawing/2014/main" id="{D444E7DA-6024-3BD2-B27F-5FBA3C07E3B6}"/>
+                <a16:creationId xmlns:a16="http://schemas.microsoft.com/office/drawing/2014/main" id="{3A70F3E3-3E6E-7AC9-E0AF-CE5451E84118}"/>
               </a:ext>
             </a:extLst>
           </p:cNvPr>
@@ -7211,7 +8618,7 @@
             <a:pPr algn="ctr"/>
             <a:r>
               <a:rPr lang="en-IN" b="1" dirty="0"/>
-              <a:t>System Architecture</a:t>
+              <a:t>Technology Stack</a:t>
             </a:r>
           </a:p>
         </p:txBody>
@@ -7221,7 +8628,7 @@
           <p:cNvPr id="2" name="Date Placeholder 1">
             <a:extLst>
               <a:ext uri="{FF2B5EF4-FFF2-40B4-BE49-F238E27FC236}">
-                <a16:creationId xmlns:a16="http://schemas.microsoft.com/office/drawing/2014/main" id="{819EA59E-4044-83AE-DEBE-E00DD76D03EC}"/>
+                <a16:creationId xmlns:a16="http://schemas.microsoft.com/office/drawing/2014/main" id="{8A619D57-8CBB-742A-EEDC-52149D1FD984}"/>
               </a:ext>
             </a:extLst>
           </p:cNvPr>
@@ -7239,7 +8646,7 @@
           <a:p>
             <a:fld id="{1C740526-B13C-439A-9391-99AE71BAF217}" type="datetime1">
               <a:rPr lang="en-IN" smtClean="0"/>
-              <a:t>29-01-2026</a:t>
+              <a:t>30-01-2026</a:t>
             </a:fld>
             <a:endParaRPr lang="en-IN"/>
           </a:p>
@@ -7250,7 +8657,7 @@
           <p:cNvPr id="3" name="Footer Placeholder 2">
             <a:extLst>
               <a:ext uri="{FF2B5EF4-FFF2-40B4-BE49-F238E27FC236}">
-                <a16:creationId xmlns:a16="http://schemas.microsoft.com/office/drawing/2014/main" id="{2712A433-749D-B020-A136-434AE955A224}"/>
+                <a16:creationId xmlns:a16="http://schemas.microsoft.com/office/drawing/2014/main" id="{8EA6EEBF-350E-CBF2-7FEF-CC4B421266D2}"/>
               </a:ext>
             </a:extLst>
           </p:cNvPr>
@@ -7278,7 +8685,7 @@
           <p:cNvPr id="4" name="Slide Number Placeholder 3">
             <a:extLst>
               <a:ext uri="{FF2B5EF4-FFF2-40B4-BE49-F238E27FC236}">
-                <a16:creationId xmlns:a16="http://schemas.microsoft.com/office/drawing/2014/main" id="{0C063DA1-E6E9-C840-4063-0CCF43E50E9F}"/>
+                <a16:creationId xmlns:a16="http://schemas.microsoft.com/office/drawing/2014/main" id="{BC1A3A9B-3E2B-33BC-3534-534583535267}"/>
               </a:ext>
             </a:extLst>
           </p:cNvPr>
@@ -7297,6 +8704,501 @@
             <a:fld id="{9C613C33-E173-4B61-B09A-57E6CCB9A758}" type="slidenum">
               <a:rPr lang="en-IN" smtClean="0"/>
               <a:t>7</a:t>
+            </a:fld>
+            <a:endParaRPr lang="en-IN"/>
+          </a:p>
+        </p:txBody>
+      </p:sp>
+      <p:sp>
+        <p:nvSpPr>
+          <p:cNvPr id="6" name="Content Placeholder 2">
+            <a:extLst>
+              <a:ext uri="{FF2B5EF4-FFF2-40B4-BE49-F238E27FC236}">
+                <a16:creationId xmlns:a16="http://schemas.microsoft.com/office/drawing/2014/main" id="{14FE852E-7B98-C93E-2BD6-ECEFFE41655A}"/>
+              </a:ext>
+            </a:extLst>
+          </p:cNvPr>
+          <p:cNvSpPr txBox="1">
+            <a:spLocks/>
+          </p:cNvSpPr>
+          <p:nvPr/>
+        </p:nvSpPr>
+        <p:spPr>
+          <a:xfrm>
+            <a:off x="0" y="1600200"/>
+            <a:ext cx="12192000" cy="4525963"/>
+          </a:xfrm>
+          <a:prstGeom prst="rect">
+            <a:avLst/>
+          </a:prstGeom>
+        </p:spPr>
+        <p:txBody>
+          <a:bodyPr vert="horz" lIns="91440" tIns="45720" rIns="91440" bIns="45720" rtlCol="0">
+            <a:normAutofit/>
+          </a:bodyPr>
+          <a:lstStyle>
+            <a:lvl1pPr marL="0" indent="0" algn="ctr" defTabSz="914400" rtl="0" eaLnBrk="1" latinLnBrk="0" hangingPunct="1">
+              <a:lnSpc>
+                <a:spcPct val="90000"/>
+              </a:lnSpc>
+              <a:spcBef>
+                <a:spcPts val="1000"/>
+              </a:spcBef>
+              <a:buFont typeface="Arial" panose="020B0604020202020204" pitchFamily="34" charset="0"/>
+              <a:buNone/>
+              <a:defRPr sz="2400" kern="1200">
+                <a:solidFill>
+                  <a:schemeClr val="tx1"/>
+                </a:solidFill>
+                <a:latin typeface="+mn-lt"/>
+                <a:ea typeface="+mn-ea"/>
+                <a:cs typeface="+mn-cs"/>
+              </a:defRPr>
+            </a:lvl1pPr>
+            <a:lvl2pPr marL="457200" indent="0" algn="ctr" defTabSz="914400" rtl="0" eaLnBrk="1" latinLnBrk="0" hangingPunct="1">
+              <a:lnSpc>
+                <a:spcPct val="90000"/>
+              </a:lnSpc>
+              <a:spcBef>
+                <a:spcPts val="500"/>
+              </a:spcBef>
+              <a:buFont typeface="Arial" panose="020B0604020202020204" pitchFamily="34" charset="0"/>
+              <a:buNone/>
+              <a:defRPr sz="2000" kern="1200">
+                <a:solidFill>
+                  <a:schemeClr val="tx1"/>
+                </a:solidFill>
+                <a:latin typeface="+mn-lt"/>
+                <a:ea typeface="+mn-ea"/>
+                <a:cs typeface="+mn-cs"/>
+              </a:defRPr>
+            </a:lvl2pPr>
+            <a:lvl3pPr marL="914400" indent="0" algn="ctr" defTabSz="914400" rtl="0" eaLnBrk="1" latinLnBrk="0" hangingPunct="1">
+              <a:lnSpc>
+                <a:spcPct val="90000"/>
+              </a:lnSpc>
+              <a:spcBef>
+                <a:spcPts val="500"/>
+              </a:spcBef>
+              <a:buFont typeface="Arial" panose="020B0604020202020204" pitchFamily="34" charset="0"/>
+              <a:buNone/>
+              <a:defRPr sz="1800" kern="1200">
+                <a:solidFill>
+                  <a:schemeClr val="tx1"/>
+                </a:solidFill>
+                <a:latin typeface="+mn-lt"/>
+                <a:ea typeface="+mn-ea"/>
+                <a:cs typeface="+mn-cs"/>
+              </a:defRPr>
+            </a:lvl3pPr>
+            <a:lvl4pPr marL="1371600" indent="0" algn="ctr" defTabSz="914400" rtl="0" eaLnBrk="1" latinLnBrk="0" hangingPunct="1">
+              <a:lnSpc>
+                <a:spcPct val="90000"/>
+              </a:lnSpc>
+              <a:spcBef>
+                <a:spcPts val="500"/>
+              </a:spcBef>
+              <a:buFont typeface="Arial" panose="020B0604020202020204" pitchFamily="34" charset="0"/>
+              <a:buNone/>
+              <a:defRPr sz="1600" kern="1200">
+                <a:solidFill>
+                  <a:schemeClr val="tx1"/>
+                </a:solidFill>
+                <a:latin typeface="+mn-lt"/>
+                <a:ea typeface="+mn-ea"/>
+                <a:cs typeface="+mn-cs"/>
+              </a:defRPr>
+            </a:lvl4pPr>
+            <a:lvl5pPr marL="1828800" indent="0" algn="ctr" defTabSz="914400" rtl="0" eaLnBrk="1" latinLnBrk="0" hangingPunct="1">
+              <a:lnSpc>
+                <a:spcPct val="90000"/>
+              </a:lnSpc>
+              <a:spcBef>
+                <a:spcPts val="500"/>
+              </a:spcBef>
+              <a:buFont typeface="Arial" panose="020B0604020202020204" pitchFamily="34" charset="0"/>
+              <a:buNone/>
+              <a:defRPr sz="1600" kern="1200">
+                <a:solidFill>
+                  <a:schemeClr val="tx1"/>
+                </a:solidFill>
+                <a:latin typeface="+mn-lt"/>
+                <a:ea typeface="+mn-ea"/>
+                <a:cs typeface="+mn-cs"/>
+              </a:defRPr>
+            </a:lvl5pPr>
+            <a:lvl6pPr marL="2286000" indent="0" algn="ctr" defTabSz="914400" rtl="0" eaLnBrk="1" latinLnBrk="0" hangingPunct="1">
+              <a:lnSpc>
+                <a:spcPct val="90000"/>
+              </a:lnSpc>
+              <a:spcBef>
+                <a:spcPts val="500"/>
+              </a:spcBef>
+              <a:buFont typeface="Arial" panose="020B0604020202020204" pitchFamily="34" charset="0"/>
+              <a:buNone/>
+              <a:defRPr sz="1600" kern="1200">
+                <a:solidFill>
+                  <a:schemeClr val="tx1"/>
+                </a:solidFill>
+                <a:latin typeface="+mn-lt"/>
+                <a:ea typeface="+mn-ea"/>
+                <a:cs typeface="+mn-cs"/>
+              </a:defRPr>
+            </a:lvl6pPr>
+            <a:lvl7pPr marL="2743200" indent="0" algn="ctr" defTabSz="914400" rtl="0" eaLnBrk="1" latinLnBrk="0" hangingPunct="1">
+              <a:lnSpc>
+                <a:spcPct val="90000"/>
+              </a:lnSpc>
+              <a:spcBef>
+                <a:spcPts val="500"/>
+              </a:spcBef>
+              <a:buFont typeface="Arial" panose="020B0604020202020204" pitchFamily="34" charset="0"/>
+              <a:buNone/>
+              <a:defRPr sz="1600" kern="1200">
+                <a:solidFill>
+                  <a:schemeClr val="tx1"/>
+                </a:solidFill>
+                <a:latin typeface="+mn-lt"/>
+                <a:ea typeface="+mn-ea"/>
+                <a:cs typeface="+mn-cs"/>
+              </a:defRPr>
+            </a:lvl7pPr>
+            <a:lvl8pPr marL="3200400" indent="0" algn="ctr" defTabSz="914400" rtl="0" eaLnBrk="1" latinLnBrk="0" hangingPunct="1">
+              <a:lnSpc>
+                <a:spcPct val="90000"/>
+              </a:lnSpc>
+              <a:spcBef>
+                <a:spcPts val="500"/>
+              </a:spcBef>
+              <a:buFont typeface="Arial" panose="020B0604020202020204" pitchFamily="34" charset="0"/>
+              <a:buNone/>
+              <a:defRPr sz="1600" kern="1200">
+                <a:solidFill>
+                  <a:schemeClr val="tx1"/>
+                </a:solidFill>
+                <a:latin typeface="+mn-lt"/>
+                <a:ea typeface="+mn-ea"/>
+                <a:cs typeface="+mn-cs"/>
+              </a:defRPr>
+            </a:lvl8pPr>
+            <a:lvl9pPr marL="3657600" indent="0" algn="ctr" defTabSz="914400" rtl="0" eaLnBrk="1" latinLnBrk="0" hangingPunct="1">
+              <a:lnSpc>
+                <a:spcPct val="90000"/>
+              </a:lnSpc>
+              <a:spcBef>
+                <a:spcPts val="500"/>
+              </a:spcBef>
+              <a:buFont typeface="Arial" panose="020B0604020202020204" pitchFamily="34" charset="0"/>
+              <a:buNone/>
+              <a:defRPr sz="1600" kern="1200">
+                <a:solidFill>
+                  <a:schemeClr val="tx1"/>
+                </a:solidFill>
+                <a:latin typeface="+mn-lt"/>
+                <a:ea typeface="+mn-ea"/>
+                <a:cs typeface="+mn-cs"/>
+              </a:defRPr>
+            </a:lvl9pPr>
+          </a:lstStyle>
+          <a:p>
+            <a:pPr algn="l"/>
+            <a:r>
+              <a:rPr lang="en-IN" dirty="0"/>
+              <a:t>Frontend:</a:t>
+            </a:r>
+          </a:p>
+          <a:p>
+            <a:pPr marL="800100" lvl="1" indent="-342900" algn="l">
+              <a:buFont typeface="Wingdings" panose="05000000000000000000" pitchFamily="2" charset="2"/>
+              <a:buChar char="ü"/>
+            </a:pPr>
+            <a:r>
+              <a:rPr lang="en-IN" dirty="0"/>
+              <a:t>React 19 (TypeScript)</a:t>
+            </a:r>
+          </a:p>
+          <a:p>
+            <a:pPr marL="800100" lvl="1" indent="-342900" algn="l">
+              <a:buFont typeface="Wingdings" panose="05000000000000000000" pitchFamily="2" charset="2"/>
+              <a:buChar char="ü"/>
+            </a:pPr>
+            <a:r>
+              <a:rPr lang="en-IN" dirty="0"/>
+              <a:t>Secure Authentication (JWT)</a:t>
+            </a:r>
+          </a:p>
+          <a:p>
+            <a:pPr algn="l"/>
+            <a:r>
+              <a:rPr lang="en-IN" dirty="0"/>
+              <a:t>Backend:</a:t>
+            </a:r>
+          </a:p>
+          <a:p>
+            <a:pPr marL="800100" lvl="1" indent="-342900" algn="l">
+              <a:lnSpc>
+                <a:spcPct val="100000"/>
+              </a:lnSpc>
+              <a:buFont typeface="Wingdings" panose="05000000000000000000" pitchFamily="2" charset="2"/>
+              <a:buChar char="ü"/>
+            </a:pPr>
+            <a:r>
+              <a:rPr lang="en-IN" dirty="0"/>
+              <a:t>Flask 3.x (Python 3.12)</a:t>
+            </a:r>
+          </a:p>
+          <a:p>
+            <a:pPr marL="800100" lvl="1" indent="-342900" algn="l">
+              <a:lnSpc>
+                <a:spcPct val="100000"/>
+              </a:lnSpc>
+              <a:buFont typeface="Wingdings" panose="05000000000000000000" pitchFamily="2" charset="2"/>
+              <a:buChar char="ü"/>
+            </a:pPr>
+            <a:r>
+              <a:rPr lang="en-IN" dirty="0"/>
+              <a:t>REST API Architecture</a:t>
+            </a:r>
+          </a:p>
+          <a:p>
+            <a:pPr algn="l"/>
+            <a:r>
+              <a:rPr lang="en-IN" dirty="0"/>
+              <a:t>Data &amp; AI:</a:t>
+            </a:r>
+          </a:p>
+          <a:p>
+            <a:pPr marL="800100" lvl="1" indent="-342900" algn="l">
+              <a:lnSpc>
+                <a:spcPct val="110000"/>
+              </a:lnSpc>
+              <a:buFont typeface="Wingdings" panose="05000000000000000000" pitchFamily="2" charset="2"/>
+              <a:buChar char="ü"/>
+            </a:pPr>
+            <a:r>
+              <a:rPr lang="en-IN" dirty="0"/>
+              <a:t>PostgreSQL (Database)</a:t>
+            </a:r>
+          </a:p>
+          <a:p>
+            <a:pPr marL="800100" lvl="1" indent="-342900" algn="l">
+              <a:lnSpc>
+                <a:spcPct val="110000"/>
+              </a:lnSpc>
+              <a:buFont typeface="Wingdings" panose="05000000000000000000" pitchFamily="2" charset="2"/>
+              <a:buChar char="ü"/>
+            </a:pPr>
+            <a:r>
+              <a:rPr lang="en-IN" dirty="0"/>
+              <a:t>Google Gemini (GenAI for explanations)</a:t>
+            </a:r>
+          </a:p>
+          <a:p>
+            <a:pPr marL="800100" lvl="1" indent="-342900" algn="l">
+              <a:lnSpc>
+                <a:spcPct val="110000"/>
+              </a:lnSpc>
+              <a:buFont typeface="Wingdings" panose="05000000000000000000" pitchFamily="2" charset="2"/>
+              <a:buChar char="ü"/>
+            </a:pPr>
+            <a:r>
+              <a:rPr lang="en-IN" dirty="0"/>
+              <a:t>Scikit-learn (ML for confidence scoring)</a:t>
+            </a:r>
+          </a:p>
+          <a:p>
+            <a:pPr marL="800100" lvl="1" indent="-342900" algn="l">
+              <a:lnSpc>
+                <a:spcPct val="110000"/>
+              </a:lnSpc>
+              <a:buFont typeface="Wingdings" panose="05000000000000000000" pitchFamily="2" charset="2"/>
+              <a:buChar char="ü"/>
+            </a:pPr>
+            <a:r>
+              <a:rPr lang="en-IN" dirty="0" err="1"/>
+              <a:t>RapidFuzz</a:t>
+            </a:r>
+            <a:r>
+              <a:rPr lang="en-IN" dirty="0"/>
+              <a:t> (String matching)</a:t>
+            </a:r>
+          </a:p>
+          <a:p>
+            <a:pPr algn="l"/>
+            <a:endParaRPr lang="en-IN" dirty="0"/>
+          </a:p>
+        </p:txBody>
+      </p:sp>
+    </p:spTree>
+    <p:extLst>
+      <p:ext uri="{BB962C8B-B14F-4D97-AF65-F5344CB8AC3E}">
+        <p14:creationId xmlns:p14="http://schemas.microsoft.com/office/powerpoint/2010/main" val="1230035686"/>
+      </p:ext>
+    </p:extLst>
+  </p:cSld>
+  <p:clrMapOvr>
+    <a:masterClrMapping/>
+  </p:clrMapOvr>
+</p:sld>
+</file>
+
+<file path=ppt/slides/slide8.xml><?xml version="1.0" encoding="utf-8"?>
+<p:sld xmlns:a="http://schemas.openxmlformats.org/drawingml/2006/main" xmlns:r="http://schemas.openxmlformats.org/officeDocument/2006/relationships" xmlns:p="http://schemas.openxmlformats.org/presentationml/2006/main">
+  <p:cSld>
+    <p:spTree>
+      <p:nvGrpSpPr>
+        <p:cNvPr id="1" name="">
+          <a:extLst>
+            <a:ext uri="{FF2B5EF4-FFF2-40B4-BE49-F238E27FC236}">
+              <a16:creationId xmlns:a16="http://schemas.microsoft.com/office/drawing/2014/main" id="{17A8D206-C6B6-3755-F49E-E3679B4A767A}"/>
+            </a:ext>
+          </a:extLst>
+        </p:cNvPr>
+        <p:cNvGrpSpPr/>
+        <p:nvPr/>
+      </p:nvGrpSpPr>
+      <p:grpSpPr>
+        <a:xfrm>
+          <a:off x="0" y="0"/>
+          <a:ext cx="0" cy="0"/>
+          <a:chOff x="0" y="0"/>
+          <a:chExt cx="0" cy="0"/>
+        </a:xfrm>
+      </p:grpSpPr>
+      <p:sp>
+        <p:nvSpPr>
+          <p:cNvPr id="5" name="Rectangle 4">
+            <a:extLst>
+              <a:ext uri="{FF2B5EF4-FFF2-40B4-BE49-F238E27FC236}">
+                <a16:creationId xmlns:a16="http://schemas.microsoft.com/office/drawing/2014/main" id="{D444E7DA-6024-3BD2-B27F-5FBA3C07E3B6}"/>
+              </a:ext>
+            </a:extLst>
+          </p:cNvPr>
+          <p:cNvSpPr/>
+          <p:nvPr/>
+        </p:nvSpPr>
+        <p:spPr>
+          <a:xfrm>
+            <a:off x="0" y="0"/>
+            <a:ext cx="12192000" cy="438912"/>
+          </a:xfrm>
+          <a:prstGeom prst="rect">
+            <a:avLst/>
+          </a:prstGeom>
+          <a:solidFill>
+            <a:schemeClr val="tx1">
+              <a:lumMod val="65000"/>
+              <a:lumOff val="35000"/>
+            </a:schemeClr>
+          </a:solidFill>
+        </p:spPr>
+        <p:style>
+          <a:lnRef idx="0">
+            <a:schemeClr val="dk1"/>
+          </a:lnRef>
+          <a:fillRef idx="3">
+            <a:schemeClr val="dk1"/>
+          </a:fillRef>
+          <a:effectRef idx="3">
+            <a:schemeClr val="dk1"/>
+          </a:effectRef>
+          <a:fontRef idx="minor">
+            <a:schemeClr val="lt1"/>
+          </a:fontRef>
+        </p:style>
+        <p:txBody>
+          <a:bodyPr rtlCol="0" anchor="ctr"/>
+          <a:lstStyle/>
+          <a:p>
+            <a:pPr algn="ctr"/>
+            <a:r>
+              <a:rPr lang="en-IN" b="1" dirty="0"/>
+              <a:t>System Architecture</a:t>
+            </a:r>
+          </a:p>
+        </p:txBody>
+      </p:sp>
+      <p:sp>
+        <p:nvSpPr>
+          <p:cNvPr id="2" name="Date Placeholder 1">
+            <a:extLst>
+              <a:ext uri="{FF2B5EF4-FFF2-40B4-BE49-F238E27FC236}">
+                <a16:creationId xmlns:a16="http://schemas.microsoft.com/office/drawing/2014/main" id="{819EA59E-4044-83AE-DEBE-E00DD76D03EC}"/>
+              </a:ext>
+            </a:extLst>
+          </p:cNvPr>
+          <p:cNvSpPr>
+            <a:spLocks noGrp="1"/>
+          </p:cNvSpPr>
+          <p:nvPr>
+            <p:ph type="dt" sz="half" idx="10"/>
+          </p:nvPr>
+        </p:nvSpPr>
+        <p:spPr/>
+        <p:txBody>
+          <a:bodyPr/>
+          <a:lstStyle/>
+          <a:p>
+            <a:fld id="{1C740526-B13C-439A-9391-99AE71BAF217}" type="datetime1">
+              <a:rPr lang="en-IN" smtClean="0"/>
+              <a:t>30-01-2026</a:t>
+            </a:fld>
+            <a:endParaRPr lang="en-IN"/>
+          </a:p>
+        </p:txBody>
+      </p:sp>
+      <p:sp>
+        <p:nvSpPr>
+          <p:cNvPr id="3" name="Footer Placeholder 2">
+            <a:extLst>
+              <a:ext uri="{FF2B5EF4-FFF2-40B4-BE49-F238E27FC236}">
+                <a16:creationId xmlns:a16="http://schemas.microsoft.com/office/drawing/2014/main" id="{2712A433-749D-B020-A136-434AE955A224}"/>
+              </a:ext>
+            </a:extLst>
+          </p:cNvPr>
+          <p:cNvSpPr>
+            <a:spLocks noGrp="1"/>
+          </p:cNvSpPr>
+          <p:nvPr>
+            <p:ph type="ftr" sz="quarter" idx="11"/>
+          </p:nvPr>
+        </p:nvSpPr>
+        <p:spPr/>
+        <p:txBody>
+          <a:bodyPr/>
+          <a:lstStyle/>
+          <a:p>
+            <a:r>
+              <a:rPr lang="en-IN"/>
+              <a:t>Private &amp; Confidential</a:t>
+            </a:r>
+          </a:p>
+        </p:txBody>
+      </p:sp>
+      <p:sp>
+        <p:nvSpPr>
+          <p:cNvPr id="4" name="Slide Number Placeholder 3">
+            <a:extLst>
+              <a:ext uri="{FF2B5EF4-FFF2-40B4-BE49-F238E27FC236}">
+                <a16:creationId xmlns:a16="http://schemas.microsoft.com/office/drawing/2014/main" id="{0C063DA1-E6E9-C840-4063-0CCF43E50E9F}"/>
+              </a:ext>
+            </a:extLst>
+          </p:cNvPr>
+          <p:cNvSpPr>
+            <a:spLocks noGrp="1"/>
+          </p:cNvSpPr>
+          <p:nvPr>
+            <p:ph type="sldNum" sz="quarter" idx="12"/>
+          </p:nvPr>
+        </p:nvSpPr>
+        <p:spPr/>
+        <p:txBody>
+          <a:bodyPr/>
+          <a:lstStyle/>
+          <a:p>
+            <a:fld id="{9C613C33-E173-4B61-B09A-57E6CCB9A758}" type="slidenum">
+              <a:rPr lang="en-IN" smtClean="0"/>
+              <a:t>8</a:t>
             </a:fld>
             <a:endParaRPr lang="en-IN"/>
           </a:p>
@@ -7626,7 +9528,7 @@
 </p:sld>
 </file>
 
-<file path=ppt/slides/slide8.xml><?xml version="1.0" encoding="utf-8"?>
+<file path=ppt/slides/slide9.xml><?xml version="1.0" encoding="utf-8"?>
 <p:sld xmlns:a="http://schemas.openxmlformats.org/drawingml/2006/main" xmlns:r="http://schemas.openxmlformats.org/officeDocument/2006/relationships" xmlns:p="http://schemas.openxmlformats.org/presentationml/2006/main">
   <p:cSld>
     <p:spTree>
@@ -7725,7 +9627,7 @@
           <a:p>
             <a:fld id="{1C740526-B13C-439A-9391-99AE71BAF217}" type="datetime1">
               <a:rPr lang="en-IN" smtClean="0"/>
-              <a:t>29-01-2026</a:t>
+              <a:t>30-01-2026</a:t>
             </a:fld>
             <a:endParaRPr lang="en-IN"/>
           </a:p>
@@ -7782,7 +9684,7 @@
           <a:p>
             <a:fld id="{9C613C33-E173-4B61-B09A-57E6CCB9A758}" type="slidenum">
               <a:rPr lang="en-IN" smtClean="0"/>
-              <a:t>8</a:t>
+              <a:t>9</a:t>
             </a:fld>
             <a:endParaRPr lang="en-IN"/>
           </a:p>
@@ -8113,472 +10015,6 @@
     <p:extLst>
       <p:ext uri="{BB962C8B-B14F-4D97-AF65-F5344CB8AC3E}">
         <p14:creationId xmlns:p14="http://schemas.microsoft.com/office/powerpoint/2010/main" val="4110963127"/>
-      </p:ext>
-    </p:extLst>
-  </p:cSld>
-  <p:clrMapOvr>
-    <a:masterClrMapping/>
-  </p:clrMapOvr>
-</p:sld>
-</file>
-
-<file path=ppt/slides/slide9.xml><?xml version="1.0" encoding="utf-8"?>
-<p:sld xmlns:a="http://schemas.openxmlformats.org/drawingml/2006/main" xmlns:r="http://schemas.openxmlformats.org/officeDocument/2006/relationships" xmlns:p="http://schemas.openxmlformats.org/presentationml/2006/main">
-  <p:cSld>
-    <p:spTree>
-      <p:nvGrpSpPr>
-        <p:cNvPr id="1" name="">
-          <a:extLst>
-            <a:ext uri="{FF2B5EF4-FFF2-40B4-BE49-F238E27FC236}">
-              <a16:creationId xmlns:a16="http://schemas.microsoft.com/office/drawing/2014/main" id="{C09A3A96-DF10-CD63-52ED-46D98BBDA00F}"/>
-            </a:ext>
-          </a:extLst>
-        </p:cNvPr>
-        <p:cNvGrpSpPr/>
-        <p:nvPr/>
-      </p:nvGrpSpPr>
-      <p:grpSpPr>
-        <a:xfrm>
-          <a:off x="0" y="0"/>
-          <a:ext cx="0" cy="0"/>
-          <a:chOff x="0" y="0"/>
-          <a:chExt cx="0" cy="0"/>
-        </a:xfrm>
-      </p:grpSpPr>
-      <p:sp>
-        <p:nvSpPr>
-          <p:cNvPr id="5" name="Rectangle 4">
-            <a:extLst>
-              <a:ext uri="{FF2B5EF4-FFF2-40B4-BE49-F238E27FC236}">
-                <a16:creationId xmlns:a16="http://schemas.microsoft.com/office/drawing/2014/main" id="{96B1B34A-1853-0742-7462-F187FFA1DEE5}"/>
-              </a:ext>
-            </a:extLst>
-          </p:cNvPr>
-          <p:cNvSpPr/>
-          <p:nvPr/>
-        </p:nvSpPr>
-        <p:spPr>
-          <a:xfrm>
-            <a:off x="0" y="0"/>
-            <a:ext cx="12192000" cy="438912"/>
-          </a:xfrm>
-          <a:prstGeom prst="rect">
-            <a:avLst/>
-          </a:prstGeom>
-          <a:solidFill>
-            <a:schemeClr val="tx1">
-              <a:lumMod val="65000"/>
-              <a:lumOff val="35000"/>
-            </a:schemeClr>
-          </a:solidFill>
-        </p:spPr>
-        <p:style>
-          <a:lnRef idx="0">
-            <a:schemeClr val="dk1"/>
-          </a:lnRef>
-          <a:fillRef idx="3">
-            <a:schemeClr val="dk1"/>
-          </a:fillRef>
-          <a:effectRef idx="3">
-            <a:schemeClr val="dk1"/>
-          </a:effectRef>
-          <a:fontRef idx="minor">
-            <a:schemeClr val="lt1"/>
-          </a:fontRef>
-        </p:style>
-        <p:txBody>
-          <a:bodyPr rtlCol="0" anchor="ctr"/>
-          <a:lstStyle/>
-          <a:p>
-            <a:pPr algn="ctr"/>
-            <a:r>
-              <a:rPr lang="en-IN" b="1" dirty="0"/>
-              <a:t>AI &amp; ML Integration</a:t>
-            </a:r>
-          </a:p>
-        </p:txBody>
-      </p:sp>
-      <p:sp>
-        <p:nvSpPr>
-          <p:cNvPr id="2" name="Date Placeholder 1">
-            <a:extLst>
-              <a:ext uri="{FF2B5EF4-FFF2-40B4-BE49-F238E27FC236}">
-                <a16:creationId xmlns:a16="http://schemas.microsoft.com/office/drawing/2014/main" id="{62D76BF2-F5AC-ED9B-4D0F-31F0A1F2C499}"/>
-              </a:ext>
-            </a:extLst>
-          </p:cNvPr>
-          <p:cNvSpPr>
-            <a:spLocks noGrp="1"/>
-          </p:cNvSpPr>
-          <p:nvPr>
-            <p:ph type="dt" sz="half" idx="10"/>
-          </p:nvPr>
-        </p:nvSpPr>
-        <p:spPr/>
-        <p:txBody>
-          <a:bodyPr/>
-          <a:lstStyle/>
-          <a:p>
-            <a:fld id="{1C740526-B13C-439A-9391-99AE71BAF217}" type="datetime1">
-              <a:rPr lang="en-IN" smtClean="0"/>
-              <a:t>29-01-2026</a:t>
-            </a:fld>
-            <a:endParaRPr lang="en-IN"/>
-          </a:p>
-        </p:txBody>
-      </p:sp>
-      <p:sp>
-        <p:nvSpPr>
-          <p:cNvPr id="3" name="Footer Placeholder 2">
-            <a:extLst>
-              <a:ext uri="{FF2B5EF4-FFF2-40B4-BE49-F238E27FC236}">
-                <a16:creationId xmlns:a16="http://schemas.microsoft.com/office/drawing/2014/main" id="{1A5F2079-7110-08CD-62D2-181FECB98E57}"/>
-              </a:ext>
-            </a:extLst>
-          </p:cNvPr>
-          <p:cNvSpPr>
-            <a:spLocks noGrp="1"/>
-          </p:cNvSpPr>
-          <p:nvPr>
-            <p:ph type="ftr" sz="quarter" idx="11"/>
-          </p:nvPr>
-        </p:nvSpPr>
-        <p:spPr/>
-        <p:txBody>
-          <a:bodyPr/>
-          <a:lstStyle/>
-          <a:p>
-            <a:r>
-              <a:rPr lang="en-IN"/>
-              <a:t>Private &amp; Confidential</a:t>
-            </a:r>
-          </a:p>
-        </p:txBody>
-      </p:sp>
-      <p:sp>
-        <p:nvSpPr>
-          <p:cNvPr id="4" name="Slide Number Placeholder 3">
-            <a:extLst>
-              <a:ext uri="{FF2B5EF4-FFF2-40B4-BE49-F238E27FC236}">
-                <a16:creationId xmlns:a16="http://schemas.microsoft.com/office/drawing/2014/main" id="{45DBB245-E953-C5D5-2D01-AEAFBBFFBC84}"/>
-              </a:ext>
-            </a:extLst>
-          </p:cNvPr>
-          <p:cNvSpPr>
-            <a:spLocks noGrp="1"/>
-          </p:cNvSpPr>
-          <p:nvPr>
-            <p:ph type="sldNum" sz="quarter" idx="12"/>
-          </p:nvPr>
-        </p:nvSpPr>
-        <p:spPr/>
-        <p:txBody>
-          <a:bodyPr/>
-          <a:lstStyle/>
-          <a:p>
-            <a:fld id="{9C613C33-E173-4B61-B09A-57E6CCB9A758}" type="slidenum">
-              <a:rPr lang="en-IN" smtClean="0"/>
-              <a:t>9</a:t>
-            </a:fld>
-            <a:endParaRPr lang="en-IN"/>
-          </a:p>
-        </p:txBody>
-      </p:sp>
-      <p:sp>
-        <p:nvSpPr>
-          <p:cNvPr id="6" name="Content Placeholder 2">
-            <a:extLst>
-              <a:ext uri="{FF2B5EF4-FFF2-40B4-BE49-F238E27FC236}">
-                <a16:creationId xmlns:a16="http://schemas.microsoft.com/office/drawing/2014/main" id="{3198424D-2440-30D4-8F33-FBD620A9F664}"/>
-              </a:ext>
-            </a:extLst>
-          </p:cNvPr>
-          <p:cNvSpPr txBox="1">
-            <a:spLocks/>
-          </p:cNvSpPr>
-          <p:nvPr/>
-        </p:nvSpPr>
-        <p:spPr>
-          <a:xfrm>
-            <a:off x="0" y="1600200"/>
-            <a:ext cx="12192000" cy="4525963"/>
-          </a:xfrm>
-          <a:prstGeom prst="rect">
-            <a:avLst/>
-          </a:prstGeom>
-        </p:spPr>
-        <p:txBody>
-          <a:bodyPr vert="horz" lIns="91440" tIns="45720" rIns="91440" bIns="45720" rtlCol="0">
-            <a:normAutofit/>
-          </a:bodyPr>
-          <a:lstStyle>
-            <a:lvl1pPr marL="0" indent="0" algn="ctr" defTabSz="914400" rtl="0" eaLnBrk="1" latinLnBrk="0" hangingPunct="1">
-              <a:lnSpc>
-                <a:spcPct val="90000"/>
-              </a:lnSpc>
-              <a:spcBef>
-                <a:spcPts val="1000"/>
-              </a:spcBef>
-              <a:buFont typeface="Arial" panose="020B0604020202020204" pitchFamily="34" charset="0"/>
-              <a:buNone/>
-              <a:defRPr sz="2400" kern="1200">
-                <a:solidFill>
-                  <a:schemeClr val="tx1"/>
-                </a:solidFill>
-                <a:latin typeface="+mn-lt"/>
-                <a:ea typeface="+mn-ea"/>
-                <a:cs typeface="+mn-cs"/>
-              </a:defRPr>
-            </a:lvl1pPr>
-            <a:lvl2pPr marL="457200" indent="0" algn="ctr" defTabSz="914400" rtl="0" eaLnBrk="1" latinLnBrk="0" hangingPunct="1">
-              <a:lnSpc>
-                <a:spcPct val="90000"/>
-              </a:lnSpc>
-              <a:spcBef>
-                <a:spcPts val="500"/>
-              </a:spcBef>
-              <a:buFont typeface="Arial" panose="020B0604020202020204" pitchFamily="34" charset="0"/>
-              <a:buNone/>
-              <a:defRPr sz="2000" kern="1200">
-                <a:solidFill>
-                  <a:schemeClr val="tx1"/>
-                </a:solidFill>
-                <a:latin typeface="+mn-lt"/>
-                <a:ea typeface="+mn-ea"/>
-                <a:cs typeface="+mn-cs"/>
-              </a:defRPr>
-            </a:lvl2pPr>
-            <a:lvl3pPr marL="914400" indent="0" algn="ctr" defTabSz="914400" rtl="0" eaLnBrk="1" latinLnBrk="0" hangingPunct="1">
-              <a:lnSpc>
-                <a:spcPct val="90000"/>
-              </a:lnSpc>
-              <a:spcBef>
-                <a:spcPts val="500"/>
-              </a:spcBef>
-              <a:buFont typeface="Arial" panose="020B0604020202020204" pitchFamily="34" charset="0"/>
-              <a:buNone/>
-              <a:defRPr sz="1800" kern="1200">
-                <a:solidFill>
-                  <a:schemeClr val="tx1"/>
-                </a:solidFill>
-                <a:latin typeface="+mn-lt"/>
-                <a:ea typeface="+mn-ea"/>
-                <a:cs typeface="+mn-cs"/>
-              </a:defRPr>
-            </a:lvl3pPr>
-            <a:lvl4pPr marL="1371600" indent="0" algn="ctr" defTabSz="914400" rtl="0" eaLnBrk="1" latinLnBrk="0" hangingPunct="1">
-              <a:lnSpc>
-                <a:spcPct val="90000"/>
-              </a:lnSpc>
-              <a:spcBef>
-                <a:spcPts val="500"/>
-              </a:spcBef>
-              <a:buFont typeface="Arial" panose="020B0604020202020204" pitchFamily="34" charset="0"/>
-              <a:buNone/>
-              <a:defRPr sz="1600" kern="1200">
-                <a:solidFill>
-                  <a:schemeClr val="tx1"/>
-                </a:solidFill>
-                <a:latin typeface="+mn-lt"/>
-                <a:ea typeface="+mn-ea"/>
-                <a:cs typeface="+mn-cs"/>
-              </a:defRPr>
-            </a:lvl4pPr>
-            <a:lvl5pPr marL="1828800" indent="0" algn="ctr" defTabSz="914400" rtl="0" eaLnBrk="1" latinLnBrk="0" hangingPunct="1">
-              <a:lnSpc>
-                <a:spcPct val="90000"/>
-              </a:lnSpc>
-              <a:spcBef>
-                <a:spcPts val="500"/>
-              </a:spcBef>
-              <a:buFont typeface="Arial" panose="020B0604020202020204" pitchFamily="34" charset="0"/>
-              <a:buNone/>
-              <a:defRPr sz="1600" kern="1200">
-                <a:solidFill>
-                  <a:schemeClr val="tx1"/>
-                </a:solidFill>
-                <a:latin typeface="+mn-lt"/>
-                <a:ea typeface="+mn-ea"/>
-                <a:cs typeface="+mn-cs"/>
-              </a:defRPr>
-            </a:lvl5pPr>
-            <a:lvl6pPr marL="2286000" indent="0" algn="ctr" defTabSz="914400" rtl="0" eaLnBrk="1" latinLnBrk="0" hangingPunct="1">
-              <a:lnSpc>
-                <a:spcPct val="90000"/>
-              </a:lnSpc>
-              <a:spcBef>
-                <a:spcPts val="500"/>
-              </a:spcBef>
-              <a:buFont typeface="Arial" panose="020B0604020202020204" pitchFamily="34" charset="0"/>
-              <a:buNone/>
-              <a:defRPr sz="1600" kern="1200">
-                <a:solidFill>
-                  <a:schemeClr val="tx1"/>
-                </a:solidFill>
-                <a:latin typeface="+mn-lt"/>
-                <a:ea typeface="+mn-ea"/>
-                <a:cs typeface="+mn-cs"/>
-              </a:defRPr>
-            </a:lvl6pPr>
-            <a:lvl7pPr marL="2743200" indent="0" algn="ctr" defTabSz="914400" rtl="0" eaLnBrk="1" latinLnBrk="0" hangingPunct="1">
-              <a:lnSpc>
-                <a:spcPct val="90000"/>
-              </a:lnSpc>
-              <a:spcBef>
-                <a:spcPts val="500"/>
-              </a:spcBef>
-              <a:buFont typeface="Arial" panose="020B0604020202020204" pitchFamily="34" charset="0"/>
-              <a:buNone/>
-              <a:defRPr sz="1600" kern="1200">
-                <a:solidFill>
-                  <a:schemeClr val="tx1"/>
-                </a:solidFill>
-                <a:latin typeface="+mn-lt"/>
-                <a:ea typeface="+mn-ea"/>
-                <a:cs typeface="+mn-cs"/>
-              </a:defRPr>
-            </a:lvl7pPr>
-            <a:lvl8pPr marL="3200400" indent="0" algn="ctr" defTabSz="914400" rtl="0" eaLnBrk="1" latinLnBrk="0" hangingPunct="1">
-              <a:lnSpc>
-                <a:spcPct val="90000"/>
-              </a:lnSpc>
-              <a:spcBef>
-                <a:spcPts val="500"/>
-              </a:spcBef>
-              <a:buFont typeface="Arial" panose="020B0604020202020204" pitchFamily="34" charset="0"/>
-              <a:buNone/>
-              <a:defRPr sz="1600" kern="1200">
-                <a:solidFill>
-                  <a:schemeClr val="tx1"/>
-                </a:solidFill>
-                <a:latin typeface="+mn-lt"/>
-                <a:ea typeface="+mn-ea"/>
-                <a:cs typeface="+mn-cs"/>
-              </a:defRPr>
-            </a:lvl8pPr>
-            <a:lvl9pPr marL="3657600" indent="0" algn="ctr" defTabSz="914400" rtl="0" eaLnBrk="1" latinLnBrk="0" hangingPunct="1">
-              <a:lnSpc>
-                <a:spcPct val="90000"/>
-              </a:lnSpc>
-              <a:spcBef>
-                <a:spcPts val="500"/>
-              </a:spcBef>
-              <a:buFont typeface="Arial" panose="020B0604020202020204" pitchFamily="34" charset="0"/>
-              <a:buNone/>
-              <a:defRPr sz="1600" kern="1200">
-                <a:solidFill>
-                  <a:schemeClr val="tx1"/>
-                </a:solidFill>
-                <a:latin typeface="+mn-lt"/>
-                <a:ea typeface="+mn-ea"/>
-                <a:cs typeface="+mn-cs"/>
-              </a:defRPr>
-            </a:lvl9pPr>
-          </a:lstStyle>
-          <a:p>
-            <a:pPr algn="l"/>
-            <a:r>
-              <a:rPr lang="en-US" dirty="0"/>
-              <a:t>Beyond Simple Matching:</a:t>
-            </a:r>
-          </a:p>
-          <a:p>
-            <a:pPr algn="l">
-              <a:lnSpc>
-                <a:spcPct val="150000"/>
-              </a:lnSpc>
-            </a:pPr>
-            <a:r>
-              <a:rPr lang="en-US" dirty="0"/>
-              <a:t>GenAI (Google Gemini):</a:t>
-            </a:r>
-          </a:p>
-          <a:p>
-            <a:pPr marL="800100" lvl="1" indent="-342900" algn="l">
-              <a:lnSpc>
-                <a:spcPct val="150000"/>
-              </a:lnSpc>
-              <a:buFont typeface="Wingdings" panose="05000000000000000000" pitchFamily="2" charset="2"/>
-              <a:buChar char="ü"/>
-            </a:pPr>
-            <a:r>
-              <a:rPr lang="en-US" dirty="0"/>
-              <a:t>Input: Source text, Target text, Scores.</a:t>
-            </a:r>
-          </a:p>
-          <a:p>
-            <a:pPr marL="800100" lvl="1" indent="-342900" algn="l">
-              <a:lnSpc>
-                <a:spcPct val="150000"/>
-              </a:lnSpc>
-              <a:buFont typeface="Wingdings" panose="05000000000000000000" pitchFamily="2" charset="2"/>
-              <a:buChar char="ü"/>
-            </a:pPr>
-            <a:r>
-              <a:rPr lang="en-US" dirty="0"/>
-              <a:t>Output: "Matched because description is 95% similar and numeric identifiers '1001' are identical."</a:t>
-            </a:r>
-          </a:p>
-          <a:p>
-            <a:pPr algn="l">
-              <a:lnSpc>
-                <a:spcPct val="150000"/>
-              </a:lnSpc>
-            </a:pPr>
-            <a:r>
-              <a:rPr lang="en-US" dirty="0"/>
-              <a:t>ML Confidence Model:</a:t>
-            </a:r>
-          </a:p>
-          <a:p>
-            <a:pPr marL="800100" lvl="1" indent="-342900" algn="l">
-              <a:lnSpc>
-                <a:spcPct val="150000"/>
-              </a:lnSpc>
-              <a:buFont typeface="Wingdings" panose="05000000000000000000" pitchFamily="2" charset="2"/>
-              <a:buChar char="ü"/>
-            </a:pPr>
-            <a:r>
-              <a:rPr lang="en-US" dirty="0"/>
-              <a:t>Features used: Text Score, Numeric Presence, Token Overlap.</a:t>
-            </a:r>
-          </a:p>
-          <a:p>
-            <a:pPr marL="800100" lvl="1" indent="-342900" algn="l">
-              <a:lnSpc>
-                <a:spcPct val="150000"/>
-              </a:lnSpc>
-              <a:buFont typeface="Wingdings" panose="05000000000000000000" pitchFamily="2" charset="2"/>
-              <a:buChar char="ü"/>
-            </a:pPr>
-            <a:r>
-              <a:rPr lang="en-US" dirty="0"/>
-              <a:t>Output: Confidence Level (HIGH / MEDIUM / LOW).</a:t>
-            </a:r>
-          </a:p>
-          <a:p>
-            <a:pPr marL="800100" lvl="1" indent="-342900" algn="l">
-              <a:lnSpc>
-                <a:spcPct val="150000"/>
-              </a:lnSpc>
-              <a:buFont typeface="Wingdings" panose="05000000000000000000" pitchFamily="2" charset="2"/>
-              <a:buChar char="ü"/>
-            </a:pPr>
-            <a:r>
-              <a:rPr lang="en-US" dirty="0"/>
-              <a:t>Benefit: Helps analysts prioritize manual review for Low/Medium confidence matches.</a:t>
-            </a:r>
-          </a:p>
-          <a:p>
-            <a:pPr algn="l"/>
-            <a:endParaRPr lang="en-US" dirty="0"/>
-          </a:p>
-        </p:txBody>
-      </p:sp>
-    </p:spTree>
-    <p:extLst>
-      <p:ext uri="{BB962C8B-B14F-4D97-AF65-F5344CB8AC3E}">
-        <p14:creationId xmlns:p14="http://schemas.microsoft.com/office/powerpoint/2010/main" val="18298761"/>
       </p:ext>
     </p:extLst>
   </p:cSld>

</xml_diff>